<commit_message>
Add foundational concepts and algorithms for weeks 1 to 4
- Week 1: Introduced algorithm efficiency, time and space complexity, recursion types.
- Week 2: Listed basic data structures and their key features, including Stack and Queue ADTs.
- Week 3: Detailed sorting algorithms (Selection, Insertion, Bubble, Merge) with time complexity analysis.
- Week 4: Started content on Quick Sort and Heap Sort.
</commit_message>
<xml_diff>
--- a/7011ICT/Week 2/Module 2 - Basic Data Structures-2.pptx
+++ b/7011ICT/Week 2/Module 2 - Basic Data Structures-2.pptx
@@ -1037,7 +1037,7 @@
           <a:p>
             <a:fld id="{552242A5-F639-4664-BD41-BCD4B3AE61B3}" type="datetimeFigureOut">
               <a:rPr lang="en-AU" smtClean="0"/>
-              <a:t>19/03/2025</a:t>
+              <a:t>31/03/2025</a:t>
             </a:fld>
             <a:endParaRPr lang="en-AU"/>
           </a:p>
@@ -1230,7 +1230,7 @@
           <a:p>
             <a:fld id="{0631B193-6215-402E-AF09-FD5F760B2495}" type="datetimeFigureOut">
               <a:rPr lang="en-AU" smtClean="0"/>
-              <a:t>19/03/2025</a:t>
+              <a:t>31/03/2025</a:t>
             </a:fld>
             <a:endParaRPr lang="en-AU"/>
           </a:p>
@@ -16271,14 +16271,14 @@
           <a:ln w="9525"/>
           <a:extLst>
             <a:ext uri="{909E8E84-426E-40dd-AFC4-6F175D3DCCD1}">
-              <a14:hiddenFill xmlns="" xmlns:a14="http://schemas.microsoft.com/office/drawing/2010/main">
+              <a14:hiddenFill xmlns:a14="http://schemas.microsoft.com/office/drawing/2010/main" xmlns="">
                 <a:solidFill>
                   <a:srgbClr val="FFFFFF"/>
                 </a:solidFill>
               </a14:hiddenFill>
             </a:ext>
             <a:ext uri="{91240B29-F687-4f45-9708-019B960494DF}">
-              <a14:hiddenLine xmlns="" xmlns:a14="http://schemas.microsoft.com/office/drawing/2010/main" w="12700">
+              <a14:hiddenLine xmlns:a14="http://schemas.microsoft.com/office/drawing/2010/main" xmlns="" w="12700">
                 <a:solidFill>
                   <a:srgbClr val="000000"/>
                 </a:solidFill>
@@ -16438,14 +16438,14 @@
           <a:ln w="9525"/>
           <a:extLst>
             <a:ext uri="{909E8E84-426E-40dd-AFC4-6F175D3DCCD1}">
-              <a14:hiddenFill xmlns="" xmlns:a14="http://schemas.microsoft.com/office/drawing/2010/main">
+              <a14:hiddenFill xmlns:a14="http://schemas.microsoft.com/office/drawing/2010/main" xmlns="">
                 <a:solidFill>
                   <a:srgbClr val="FFFFFF"/>
                 </a:solidFill>
               </a14:hiddenFill>
             </a:ext>
             <a:ext uri="{91240B29-F687-4f45-9708-019B960494DF}">
-              <a14:hiddenLine xmlns="" xmlns:a14="http://schemas.microsoft.com/office/drawing/2010/main" w="9525">
+              <a14:hiddenLine xmlns:a14="http://schemas.microsoft.com/office/drawing/2010/main" xmlns="" w="9525">
                 <a:solidFill>
                   <a:srgbClr val="000000"/>
                 </a:solidFill>
@@ -16455,7 +16455,7 @@
               </a14:hiddenLine>
             </a:ext>
             <a:ext uri="{FAA26D3D-D897-4be2-8F04-BA451C77F1D7}">
-              <ma14:placeholderFlag xmlns="" xmlns:ma14="http://schemas.microsoft.com/office/mac/drawingml/2011/main" val="1"/>
+              <ma14:placeholderFlag xmlns:ma14="http://schemas.microsoft.com/office/mac/drawingml/2011/main" xmlns="" val="1"/>
             </a:ext>
           </a:extLst>
         </p:spPr>
@@ -23906,14 +23906,14 @@
           </a:ln>
           <a:extLst>
             <a:ext uri="{909E8E84-426E-40dd-AFC4-6F175D3DCCD1}">
-              <a14:hiddenFill xmlns="" xmlns:a14="http://schemas.microsoft.com/office/drawing/2010/main">
+              <a14:hiddenFill xmlns:a14="http://schemas.microsoft.com/office/drawing/2010/main" xmlns="">
                 <a:solidFill>
                   <a:srgbClr val="FFFFFF"/>
                 </a:solidFill>
               </a14:hiddenFill>
             </a:ext>
             <a:ext uri="{91240B29-F687-4f45-9708-019B960494DF}">
-              <a14:hiddenLine xmlns="" xmlns:a14="http://schemas.microsoft.com/office/drawing/2010/main" w="9525">
+              <a14:hiddenLine xmlns:a14="http://schemas.microsoft.com/office/drawing/2010/main" xmlns="" w="9525">
                 <a:solidFill>
                   <a:srgbClr val="000000"/>
                 </a:solidFill>
@@ -23946,14 +23946,14 @@
           <a:effectLst/>
           <a:extLst>
             <a:ext uri="{909E8E84-426E-40dd-AFC4-6F175D3DCCD1}">
-              <a14:hiddenFill xmlns="" xmlns:a14="http://schemas.microsoft.com/office/drawing/2010/main">
+              <a14:hiddenFill xmlns:a14="http://schemas.microsoft.com/office/drawing/2010/main" xmlns="">
                 <a:solidFill>
                   <a:schemeClr val="accent1"/>
                 </a:solidFill>
               </a14:hiddenFill>
             </a:ext>
             <a:ext uri="{91240B29-F687-4f45-9708-019B960494DF}">
-              <a14:hiddenLine xmlns="" xmlns:a14="http://schemas.microsoft.com/office/drawing/2010/main" w="9525">
+              <a14:hiddenLine xmlns:a14="http://schemas.microsoft.com/office/drawing/2010/main" xmlns="" w="9525">
                 <a:solidFill>
                   <a:schemeClr val="tx1"/>
                 </a:solidFill>
@@ -23963,7 +23963,7 @@
               </a14:hiddenLine>
             </a:ext>
             <a:ext uri="{AF507438-7753-43e0-B8FC-AC1667EBCBE1}">
-              <a14:hiddenEffects xmlns="" xmlns:a14="http://schemas.microsoft.com/office/drawing/2010/main">
+              <a14:hiddenEffects xmlns:a14="http://schemas.microsoft.com/office/drawing/2010/main" xmlns="">
                 <a:effectLst>
                   <a:outerShdw blurRad="63500" dist="38099" dir="2700000" algn="ctr" rotWithShape="0">
                     <a:schemeClr val="bg2">
@@ -23974,7 +23974,7 @@
               </a14:hiddenEffects>
             </a:ext>
             <a:ext uri="{FAA26D3D-D897-4be2-8F04-BA451C77F1D7}">
-              <ma14:placeholderFlag xmlns="" xmlns:ma14="http://schemas.microsoft.com/office/mac/drawingml/2011/main" val="1"/>
+              <ma14:placeholderFlag xmlns:ma14="http://schemas.microsoft.com/office/mac/drawingml/2011/main" xmlns="" val="1"/>
             </a:ext>
           </a:extLst>
         </p:spPr>
@@ -24108,14 +24108,14 @@
           </a:ln>
           <a:extLst>
             <a:ext uri="{909E8E84-426E-40dd-AFC4-6F175D3DCCD1}">
-              <a14:hiddenFill xmlns="" xmlns:a14="http://schemas.microsoft.com/office/drawing/2010/main">
+              <a14:hiddenFill xmlns:a14="http://schemas.microsoft.com/office/drawing/2010/main" xmlns="">
                 <a:solidFill>
                   <a:srgbClr val="FFFFFF"/>
                 </a:solidFill>
               </a14:hiddenFill>
             </a:ext>
             <a:ext uri="{91240B29-F687-4f45-9708-019B960494DF}">
-              <a14:hiddenLine xmlns="" xmlns:a14="http://schemas.microsoft.com/office/drawing/2010/main" w="9525">
+              <a14:hiddenLine xmlns:a14="http://schemas.microsoft.com/office/drawing/2010/main" xmlns="" w="9525">
                 <a:solidFill>
                   <a:srgbClr val="000000"/>
                 </a:solidFill>
@@ -24148,14 +24148,14 @@
           <a:effectLst/>
           <a:extLst>
             <a:ext uri="{909E8E84-426E-40dd-AFC4-6F175D3DCCD1}">
-              <a14:hiddenFill xmlns="" xmlns:a14="http://schemas.microsoft.com/office/drawing/2010/main">
+              <a14:hiddenFill xmlns:a14="http://schemas.microsoft.com/office/drawing/2010/main" xmlns="">
                 <a:solidFill>
                   <a:schemeClr val="accent1"/>
                 </a:solidFill>
               </a14:hiddenFill>
             </a:ext>
             <a:ext uri="{91240B29-F687-4f45-9708-019B960494DF}">
-              <a14:hiddenLine xmlns="" xmlns:a14="http://schemas.microsoft.com/office/drawing/2010/main" w="9525">
+              <a14:hiddenLine xmlns:a14="http://schemas.microsoft.com/office/drawing/2010/main" xmlns="" w="9525">
                 <a:solidFill>
                   <a:schemeClr val="tx1"/>
                 </a:solidFill>
@@ -24165,7 +24165,7 @@
               </a14:hiddenLine>
             </a:ext>
             <a:ext uri="{AF507438-7753-43e0-B8FC-AC1667EBCBE1}">
-              <a14:hiddenEffects xmlns="" xmlns:a14="http://schemas.microsoft.com/office/drawing/2010/main">
+              <a14:hiddenEffects xmlns:a14="http://schemas.microsoft.com/office/drawing/2010/main" xmlns="">
                 <a:effectLst>
                   <a:outerShdw blurRad="63500" dist="38099" dir="2700000" algn="ctr" rotWithShape="0">
                     <a:schemeClr val="bg2">
@@ -24176,7 +24176,7 @@
               </a14:hiddenEffects>
             </a:ext>
             <a:ext uri="{FAA26D3D-D897-4be2-8F04-BA451C77F1D7}">
-              <ma14:placeholderFlag xmlns="" xmlns:ma14="http://schemas.microsoft.com/office/mac/drawingml/2011/main" val="1"/>
+              <ma14:placeholderFlag xmlns:ma14="http://schemas.microsoft.com/office/mac/drawingml/2011/main" xmlns="" val="1"/>
             </a:ext>
           </a:extLst>
         </p:spPr>
@@ -24310,14 +24310,14 @@
           </a:ln>
           <a:extLst>
             <a:ext uri="{909E8E84-426E-40dd-AFC4-6F175D3DCCD1}">
-              <a14:hiddenFill xmlns="" xmlns:a14="http://schemas.microsoft.com/office/drawing/2010/main">
+              <a14:hiddenFill xmlns:a14="http://schemas.microsoft.com/office/drawing/2010/main" xmlns="">
                 <a:solidFill>
                   <a:srgbClr val="FFFFFF"/>
                 </a:solidFill>
               </a14:hiddenFill>
             </a:ext>
             <a:ext uri="{91240B29-F687-4f45-9708-019B960494DF}">
-              <a14:hiddenLine xmlns="" xmlns:a14="http://schemas.microsoft.com/office/drawing/2010/main" w="9525">
+              <a14:hiddenLine xmlns:a14="http://schemas.microsoft.com/office/drawing/2010/main" xmlns="" w="9525">
                 <a:solidFill>
                   <a:srgbClr val="000000"/>
                 </a:solidFill>
@@ -24350,14 +24350,14 @@
           <a:effectLst/>
           <a:extLst>
             <a:ext uri="{909E8E84-426E-40dd-AFC4-6F175D3DCCD1}">
-              <a14:hiddenFill xmlns="" xmlns:a14="http://schemas.microsoft.com/office/drawing/2010/main">
+              <a14:hiddenFill xmlns:a14="http://schemas.microsoft.com/office/drawing/2010/main" xmlns="">
                 <a:solidFill>
                   <a:schemeClr val="accent1"/>
                 </a:solidFill>
               </a14:hiddenFill>
             </a:ext>
             <a:ext uri="{91240B29-F687-4f45-9708-019B960494DF}">
-              <a14:hiddenLine xmlns="" xmlns:a14="http://schemas.microsoft.com/office/drawing/2010/main" w="9525">
+              <a14:hiddenLine xmlns:a14="http://schemas.microsoft.com/office/drawing/2010/main" xmlns="" w="9525">
                 <a:solidFill>
                   <a:schemeClr val="tx1"/>
                 </a:solidFill>
@@ -24367,7 +24367,7 @@
               </a14:hiddenLine>
             </a:ext>
             <a:ext uri="{AF507438-7753-43e0-B8FC-AC1667EBCBE1}">
-              <a14:hiddenEffects xmlns="" xmlns:a14="http://schemas.microsoft.com/office/drawing/2010/main">
+              <a14:hiddenEffects xmlns:a14="http://schemas.microsoft.com/office/drawing/2010/main" xmlns="">
                 <a:effectLst>
                   <a:outerShdw blurRad="63500" dist="38099" dir="2700000" algn="ctr" rotWithShape="0">
                     <a:schemeClr val="bg2">
@@ -24378,7 +24378,7 @@
               </a14:hiddenEffects>
             </a:ext>
             <a:ext uri="{FAA26D3D-D897-4be2-8F04-BA451C77F1D7}">
-              <ma14:placeholderFlag xmlns="" xmlns:ma14="http://schemas.microsoft.com/office/mac/drawingml/2011/main" val="1"/>
+              <ma14:placeholderFlag xmlns:ma14="http://schemas.microsoft.com/office/mac/drawingml/2011/main" xmlns="" val="1"/>
             </a:ext>
           </a:extLst>
         </p:spPr>
@@ -24471,14 +24471,14 @@
           </a:ln>
           <a:extLst>
             <a:ext uri="{909E8E84-426E-40dd-AFC4-6F175D3DCCD1}">
-              <a14:hiddenFill xmlns="" xmlns:a14="http://schemas.microsoft.com/office/drawing/2010/main">
+              <a14:hiddenFill xmlns:a14="http://schemas.microsoft.com/office/drawing/2010/main" xmlns="">
                 <a:solidFill>
                   <a:srgbClr val="FFFFFF"/>
                 </a:solidFill>
               </a14:hiddenFill>
             </a:ext>
             <a:ext uri="{91240B29-F687-4f45-9708-019B960494DF}">
-              <a14:hiddenLine xmlns="" xmlns:a14="http://schemas.microsoft.com/office/drawing/2010/main" w="9525">
+              <a14:hiddenLine xmlns:a14="http://schemas.microsoft.com/office/drawing/2010/main" xmlns="" w="9525">
                 <a:solidFill>
                   <a:srgbClr val="000000"/>
                 </a:solidFill>
@@ -24511,14 +24511,14 @@
           <a:effectLst/>
           <a:extLst>
             <a:ext uri="{909E8E84-426E-40dd-AFC4-6F175D3DCCD1}">
-              <a14:hiddenFill xmlns="" xmlns:a14="http://schemas.microsoft.com/office/drawing/2010/main">
+              <a14:hiddenFill xmlns:a14="http://schemas.microsoft.com/office/drawing/2010/main" xmlns="">
                 <a:solidFill>
                   <a:schemeClr val="accent1"/>
                 </a:solidFill>
               </a14:hiddenFill>
             </a:ext>
             <a:ext uri="{91240B29-F687-4f45-9708-019B960494DF}">
-              <a14:hiddenLine xmlns="" xmlns:a14="http://schemas.microsoft.com/office/drawing/2010/main" w="9525">
+              <a14:hiddenLine xmlns:a14="http://schemas.microsoft.com/office/drawing/2010/main" xmlns="" w="9525">
                 <a:solidFill>
                   <a:schemeClr val="tx1"/>
                 </a:solidFill>
@@ -24528,7 +24528,7 @@
               </a14:hiddenLine>
             </a:ext>
             <a:ext uri="{AF507438-7753-43e0-B8FC-AC1667EBCBE1}">
-              <a14:hiddenEffects xmlns="" xmlns:a14="http://schemas.microsoft.com/office/drawing/2010/main">
+              <a14:hiddenEffects xmlns:a14="http://schemas.microsoft.com/office/drawing/2010/main" xmlns="">
                 <a:effectLst>
                   <a:outerShdw blurRad="63500" dist="38099" dir="2700000" algn="ctr" rotWithShape="0">
                     <a:schemeClr val="bg2">
@@ -24539,7 +24539,7 @@
               </a14:hiddenEffects>
             </a:ext>
             <a:ext uri="{FAA26D3D-D897-4be2-8F04-BA451C77F1D7}">
-              <ma14:placeholderFlag xmlns="" xmlns:ma14="http://schemas.microsoft.com/office/mac/drawingml/2011/main" val="1"/>
+              <ma14:placeholderFlag xmlns:ma14="http://schemas.microsoft.com/office/mac/drawingml/2011/main" xmlns="" val="1"/>
             </a:ext>
           </a:extLst>
         </p:spPr>
@@ -24679,14 +24679,14 @@
           </a:ln>
           <a:extLst>
             <a:ext uri="{909E8E84-426E-40dd-AFC4-6F175D3DCCD1}">
-              <a14:hiddenFill xmlns="" xmlns:a14="http://schemas.microsoft.com/office/drawing/2010/main">
+              <a14:hiddenFill xmlns:a14="http://schemas.microsoft.com/office/drawing/2010/main" xmlns="">
                 <a:solidFill>
                   <a:srgbClr val="FFFFFF"/>
                 </a:solidFill>
               </a14:hiddenFill>
             </a:ext>
             <a:ext uri="{91240B29-F687-4f45-9708-019B960494DF}">
-              <a14:hiddenLine xmlns="" xmlns:a14="http://schemas.microsoft.com/office/drawing/2010/main" w="9525">
+              <a14:hiddenLine xmlns:a14="http://schemas.microsoft.com/office/drawing/2010/main" xmlns="" w="9525">
                 <a:solidFill>
                   <a:srgbClr val="000000"/>
                 </a:solidFill>
@@ -24719,14 +24719,14 @@
           <a:effectLst/>
           <a:extLst>
             <a:ext uri="{909E8E84-426E-40dd-AFC4-6F175D3DCCD1}">
-              <a14:hiddenFill xmlns="" xmlns:a14="http://schemas.microsoft.com/office/drawing/2010/main">
+              <a14:hiddenFill xmlns:a14="http://schemas.microsoft.com/office/drawing/2010/main" xmlns="">
                 <a:solidFill>
                   <a:schemeClr val="accent1"/>
                 </a:solidFill>
               </a14:hiddenFill>
             </a:ext>
             <a:ext uri="{91240B29-F687-4f45-9708-019B960494DF}">
-              <a14:hiddenLine xmlns="" xmlns:a14="http://schemas.microsoft.com/office/drawing/2010/main" w="9525">
+              <a14:hiddenLine xmlns:a14="http://schemas.microsoft.com/office/drawing/2010/main" xmlns="" w="9525">
                 <a:solidFill>
                   <a:schemeClr val="tx1"/>
                 </a:solidFill>
@@ -24736,7 +24736,7 @@
               </a14:hiddenLine>
             </a:ext>
             <a:ext uri="{AF507438-7753-43e0-B8FC-AC1667EBCBE1}">
-              <a14:hiddenEffects xmlns="" xmlns:a14="http://schemas.microsoft.com/office/drawing/2010/main">
+              <a14:hiddenEffects xmlns:a14="http://schemas.microsoft.com/office/drawing/2010/main" xmlns="">
                 <a:effectLst>
                   <a:outerShdw blurRad="63500" dist="38099" dir="2700000" algn="ctr" rotWithShape="0">
                     <a:schemeClr val="bg2">
@@ -24747,7 +24747,7 @@
               </a14:hiddenEffects>
             </a:ext>
             <a:ext uri="{FAA26D3D-D897-4be2-8F04-BA451C77F1D7}">
-              <ma14:placeholderFlag xmlns="" xmlns:ma14="http://schemas.microsoft.com/office/mac/drawingml/2011/main" val="1"/>
+              <ma14:placeholderFlag xmlns:ma14="http://schemas.microsoft.com/office/mac/drawingml/2011/main" xmlns="" val="1"/>
             </a:ext>
           </a:extLst>
         </p:spPr>
@@ -24887,14 +24887,14 @@
           </a:ln>
           <a:extLst>
             <a:ext uri="{909E8E84-426E-40dd-AFC4-6F175D3DCCD1}">
-              <a14:hiddenFill xmlns="" xmlns:a14="http://schemas.microsoft.com/office/drawing/2010/main">
+              <a14:hiddenFill xmlns:a14="http://schemas.microsoft.com/office/drawing/2010/main" xmlns="">
                 <a:solidFill>
                   <a:srgbClr val="FFFFFF"/>
                 </a:solidFill>
               </a14:hiddenFill>
             </a:ext>
             <a:ext uri="{91240B29-F687-4f45-9708-019B960494DF}">
-              <a14:hiddenLine xmlns="" xmlns:a14="http://schemas.microsoft.com/office/drawing/2010/main" w="9525">
+              <a14:hiddenLine xmlns:a14="http://schemas.microsoft.com/office/drawing/2010/main" xmlns="" w="9525">
                 <a:solidFill>
                   <a:srgbClr val="000000"/>
                 </a:solidFill>
@@ -24927,14 +24927,14 @@
           <a:effectLst/>
           <a:extLst>
             <a:ext uri="{909E8E84-426E-40dd-AFC4-6F175D3DCCD1}">
-              <a14:hiddenFill xmlns="" xmlns:a14="http://schemas.microsoft.com/office/drawing/2010/main">
+              <a14:hiddenFill xmlns:a14="http://schemas.microsoft.com/office/drawing/2010/main" xmlns="">
                 <a:solidFill>
                   <a:schemeClr val="accent1"/>
                 </a:solidFill>
               </a14:hiddenFill>
             </a:ext>
             <a:ext uri="{91240B29-F687-4f45-9708-019B960494DF}">
-              <a14:hiddenLine xmlns="" xmlns:a14="http://schemas.microsoft.com/office/drawing/2010/main" w="9525">
+              <a14:hiddenLine xmlns:a14="http://schemas.microsoft.com/office/drawing/2010/main" xmlns="" w="9525">
                 <a:solidFill>
                   <a:schemeClr val="tx1"/>
                 </a:solidFill>
@@ -24944,7 +24944,7 @@
               </a14:hiddenLine>
             </a:ext>
             <a:ext uri="{AF507438-7753-43e0-B8FC-AC1667EBCBE1}">
-              <a14:hiddenEffects xmlns="" xmlns:a14="http://schemas.microsoft.com/office/drawing/2010/main">
+              <a14:hiddenEffects xmlns:a14="http://schemas.microsoft.com/office/drawing/2010/main" xmlns="">
                 <a:effectLst>
                   <a:outerShdw blurRad="63500" dist="38099" dir="2700000" algn="ctr" rotWithShape="0">
                     <a:schemeClr val="bg2">
@@ -24955,7 +24955,7 @@
               </a14:hiddenEffects>
             </a:ext>
             <a:ext uri="{FAA26D3D-D897-4be2-8F04-BA451C77F1D7}">
-              <ma14:placeholderFlag xmlns="" xmlns:ma14="http://schemas.microsoft.com/office/mac/drawingml/2011/main" val="1"/>
+              <ma14:placeholderFlag xmlns:ma14="http://schemas.microsoft.com/office/mac/drawingml/2011/main" xmlns="" val="1"/>
             </a:ext>
           </a:extLst>
         </p:spPr>
@@ -25095,14 +25095,14 @@
           </a:ln>
           <a:extLst>
             <a:ext uri="{909E8E84-426E-40dd-AFC4-6F175D3DCCD1}">
-              <a14:hiddenFill xmlns="" xmlns:a14="http://schemas.microsoft.com/office/drawing/2010/main">
+              <a14:hiddenFill xmlns:a14="http://schemas.microsoft.com/office/drawing/2010/main" xmlns="">
                 <a:solidFill>
                   <a:srgbClr val="FFFFFF"/>
                 </a:solidFill>
               </a14:hiddenFill>
             </a:ext>
             <a:ext uri="{91240B29-F687-4f45-9708-019B960494DF}">
-              <a14:hiddenLine xmlns="" xmlns:a14="http://schemas.microsoft.com/office/drawing/2010/main" w="9525">
+              <a14:hiddenLine xmlns:a14="http://schemas.microsoft.com/office/drawing/2010/main" xmlns="" w="9525">
                 <a:solidFill>
                   <a:srgbClr val="000000"/>
                 </a:solidFill>
@@ -25135,14 +25135,14 @@
           <a:effectLst/>
           <a:extLst>
             <a:ext uri="{909E8E84-426E-40dd-AFC4-6F175D3DCCD1}">
-              <a14:hiddenFill xmlns="" xmlns:a14="http://schemas.microsoft.com/office/drawing/2010/main">
+              <a14:hiddenFill xmlns:a14="http://schemas.microsoft.com/office/drawing/2010/main" xmlns="">
                 <a:solidFill>
                   <a:schemeClr val="accent1"/>
                 </a:solidFill>
               </a14:hiddenFill>
             </a:ext>
             <a:ext uri="{91240B29-F687-4f45-9708-019B960494DF}">
-              <a14:hiddenLine xmlns="" xmlns:a14="http://schemas.microsoft.com/office/drawing/2010/main" w="9525">
+              <a14:hiddenLine xmlns:a14="http://schemas.microsoft.com/office/drawing/2010/main" xmlns="" w="9525">
                 <a:solidFill>
                   <a:schemeClr val="tx1"/>
                 </a:solidFill>
@@ -25152,7 +25152,7 @@
               </a14:hiddenLine>
             </a:ext>
             <a:ext uri="{AF507438-7753-43e0-B8FC-AC1667EBCBE1}">
-              <a14:hiddenEffects xmlns="" xmlns:a14="http://schemas.microsoft.com/office/drawing/2010/main">
+              <a14:hiddenEffects xmlns:a14="http://schemas.microsoft.com/office/drawing/2010/main" xmlns="">
                 <a:effectLst>
                   <a:outerShdw blurRad="63500" dist="38099" dir="2700000" algn="ctr" rotWithShape="0">
                     <a:schemeClr val="bg2">
@@ -25163,7 +25163,7 @@
               </a14:hiddenEffects>
             </a:ext>
             <a:ext uri="{FAA26D3D-D897-4be2-8F04-BA451C77F1D7}">
-              <ma14:placeholderFlag xmlns="" xmlns:ma14="http://schemas.microsoft.com/office/mac/drawingml/2011/main" val="1"/>
+              <ma14:placeholderFlag xmlns:ma14="http://schemas.microsoft.com/office/mac/drawingml/2011/main" xmlns="" val="1"/>
             </a:ext>
           </a:extLst>
         </p:spPr>
@@ -25303,14 +25303,14 @@
           </a:ln>
           <a:extLst>
             <a:ext uri="{909E8E84-426E-40dd-AFC4-6F175D3DCCD1}">
-              <a14:hiddenFill xmlns="" xmlns:a14="http://schemas.microsoft.com/office/drawing/2010/main">
+              <a14:hiddenFill xmlns:a14="http://schemas.microsoft.com/office/drawing/2010/main" xmlns="">
                 <a:solidFill>
                   <a:srgbClr val="FFFFFF"/>
                 </a:solidFill>
               </a14:hiddenFill>
             </a:ext>
             <a:ext uri="{91240B29-F687-4f45-9708-019B960494DF}">
-              <a14:hiddenLine xmlns="" xmlns:a14="http://schemas.microsoft.com/office/drawing/2010/main" w="9525">
+              <a14:hiddenLine xmlns:a14="http://schemas.microsoft.com/office/drawing/2010/main" xmlns="" w="9525">
                 <a:solidFill>
                   <a:srgbClr val="000000"/>
                 </a:solidFill>
@@ -25343,14 +25343,14 @@
           <a:effectLst/>
           <a:extLst>
             <a:ext uri="{909E8E84-426E-40dd-AFC4-6F175D3DCCD1}">
-              <a14:hiddenFill xmlns="" xmlns:a14="http://schemas.microsoft.com/office/drawing/2010/main">
+              <a14:hiddenFill xmlns:a14="http://schemas.microsoft.com/office/drawing/2010/main" xmlns="">
                 <a:solidFill>
                   <a:schemeClr val="accent1"/>
                 </a:solidFill>
               </a14:hiddenFill>
             </a:ext>
             <a:ext uri="{91240B29-F687-4f45-9708-019B960494DF}">
-              <a14:hiddenLine xmlns="" xmlns:a14="http://schemas.microsoft.com/office/drawing/2010/main" w="9525">
+              <a14:hiddenLine xmlns:a14="http://schemas.microsoft.com/office/drawing/2010/main" xmlns="" w="9525">
                 <a:solidFill>
                   <a:schemeClr val="tx1"/>
                 </a:solidFill>
@@ -25360,7 +25360,7 @@
               </a14:hiddenLine>
             </a:ext>
             <a:ext uri="{AF507438-7753-43e0-B8FC-AC1667EBCBE1}">
-              <a14:hiddenEffects xmlns="" xmlns:a14="http://schemas.microsoft.com/office/drawing/2010/main">
+              <a14:hiddenEffects xmlns:a14="http://schemas.microsoft.com/office/drawing/2010/main" xmlns="">
                 <a:effectLst>
                   <a:outerShdw blurRad="63500" dist="38099" dir="2700000" algn="ctr" rotWithShape="0">
                     <a:schemeClr val="bg2">
@@ -25371,7 +25371,7 @@
               </a14:hiddenEffects>
             </a:ext>
             <a:ext uri="{FAA26D3D-D897-4be2-8F04-BA451C77F1D7}">
-              <ma14:placeholderFlag xmlns="" xmlns:ma14="http://schemas.microsoft.com/office/mac/drawingml/2011/main" val="1"/>
+              <ma14:placeholderFlag xmlns:ma14="http://schemas.microsoft.com/office/mac/drawingml/2011/main" xmlns="" val="1"/>
             </a:ext>
           </a:extLst>
         </p:spPr>
@@ -25687,14 +25687,14 @@
           </a:ln>
           <a:extLst>
             <a:ext uri="{909E8E84-426E-40dd-AFC4-6F175D3DCCD1}">
-              <a14:hiddenFill xmlns="" xmlns:a14="http://schemas.microsoft.com/office/drawing/2010/main">
+              <a14:hiddenFill xmlns:a14="http://schemas.microsoft.com/office/drawing/2010/main" xmlns="">
                 <a:solidFill>
                   <a:srgbClr val="FFFFFF"/>
                 </a:solidFill>
               </a14:hiddenFill>
             </a:ext>
             <a:ext uri="{91240B29-F687-4f45-9708-019B960494DF}">
-              <a14:hiddenLine xmlns="" xmlns:a14="http://schemas.microsoft.com/office/drawing/2010/main" w="9525">
+              <a14:hiddenLine xmlns:a14="http://schemas.microsoft.com/office/drawing/2010/main" xmlns="" w="9525">
                 <a:solidFill>
                   <a:srgbClr val="000000"/>
                 </a:solidFill>
@@ -25727,14 +25727,14 @@
           <a:effectLst/>
           <a:extLst>
             <a:ext uri="{909E8E84-426E-40dd-AFC4-6F175D3DCCD1}">
-              <a14:hiddenFill xmlns="" xmlns:a14="http://schemas.microsoft.com/office/drawing/2010/main">
+              <a14:hiddenFill xmlns:a14="http://schemas.microsoft.com/office/drawing/2010/main" xmlns="">
                 <a:solidFill>
                   <a:schemeClr val="accent1"/>
                 </a:solidFill>
               </a14:hiddenFill>
             </a:ext>
             <a:ext uri="{91240B29-F687-4f45-9708-019B960494DF}">
-              <a14:hiddenLine xmlns="" xmlns:a14="http://schemas.microsoft.com/office/drawing/2010/main" w="9525">
+              <a14:hiddenLine xmlns:a14="http://schemas.microsoft.com/office/drawing/2010/main" xmlns="" w="9525">
                 <a:solidFill>
                   <a:schemeClr val="tx1"/>
                 </a:solidFill>
@@ -25744,7 +25744,7 @@
               </a14:hiddenLine>
             </a:ext>
             <a:ext uri="{AF507438-7753-43e0-B8FC-AC1667EBCBE1}">
-              <a14:hiddenEffects xmlns="" xmlns:a14="http://schemas.microsoft.com/office/drawing/2010/main">
+              <a14:hiddenEffects xmlns:a14="http://schemas.microsoft.com/office/drawing/2010/main" xmlns="">
                 <a:effectLst>
                   <a:outerShdw blurRad="63500" dist="38099" dir="2700000" algn="ctr" rotWithShape="0">
                     <a:schemeClr val="bg2">
@@ -25755,7 +25755,7 @@
               </a14:hiddenEffects>
             </a:ext>
             <a:ext uri="{FAA26D3D-D897-4be2-8F04-BA451C77F1D7}">
-              <ma14:placeholderFlag xmlns="" xmlns:ma14="http://schemas.microsoft.com/office/mac/drawingml/2011/main" val="1"/>
+              <ma14:placeholderFlag xmlns:ma14="http://schemas.microsoft.com/office/mac/drawingml/2011/main" xmlns="" val="1"/>
             </a:ext>
           </a:extLst>
         </p:spPr>
@@ -25979,14 +25979,14 @@
           <a:effectLst/>
           <a:extLst>
             <a:ext uri="{909E8E84-426E-40dd-AFC4-6F175D3DCCD1}">
-              <a14:hiddenFill xmlns="" xmlns:a14="http://schemas.microsoft.com/office/drawing/2010/main">
+              <a14:hiddenFill xmlns:a14="http://schemas.microsoft.com/office/drawing/2010/main" xmlns="">
                 <a:solidFill>
                   <a:schemeClr val="accent1"/>
                 </a:solidFill>
               </a14:hiddenFill>
             </a:ext>
             <a:ext uri="{91240B29-F687-4f45-9708-019B960494DF}">
-              <a14:hiddenLine xmlns="" xmlns:a14="http://schemas.microsoft.com/office/drawing/2010/main" w="9525">
+              <a14:hiddenLine xmlns:a14="http://schemas.microsoft.com/office/drawing/2010/main" xmlns="" w="9525">
                 <a:solidFill>
                   <a:schemeClr val="tx1"/>
                 </a:solidFill>
@@ -25996,7 +25996,7 @@
               </a14:hiddenLine>
             </a:ext>
             <a:ext uri="{AF507438-7753-43e0-B8FC-AC1667EBCBE1}">
-              <a14:hiddenEffects xmlns="" xmlns:a14="http://schemas.microsoft.com/office/drawing/2010/main">
+              <a14:hiddenEffects xmlns:a14="http://schemas.microsoft.com/office/drawing/2010/main" xmlns="">
                 <a:effectLst>
                   <a:outerShdw blurRad="63500" dist="38099" dir="2700000" algn="ctr" rotWithShape="0">
                     <a:schemeClr val="bg2">
@@ -26007,7 +26007,7 @@
               </a14:hiddenEffects>
             </a:ext>
             <a:ext uri="{FAA26D3D-D897-4be2-8F04-BA451C77F1D7}">
-              <ma14:placeholderFlag xmlns="" xmlns:ma14="http://schemas.microsoft.com/office/mac/drawingml/2011/main" val="1"/>
+              <ma14:placeholderFlag xmlns:ma14="http://schemas.microsoft.com/office/mac/drawingml/2011/main" xmlns="" val="1"/>
             </a:ext>
           </a:extLst>
         </p:spPr>
@@ -26105,14 +26105,14 @@
           <a:effectLst/>
           <a:extLst>
             <a:ext uri="{909E8E84-426E-40dd-AFC4-6F175D3DCCD1}">
-              <a14:hiddenFill xmlns="" xmlns:a14="http://schemas.microsoft.com/office/drawing/2010/main">
+              <a14:hiddenFill xmlns:a14="http://schemas.microsoft.com/office/drawing/2010/main" xmlns="">
                 <a:solidFill>
                   <a:schemeClr val="accent1"/>
                 </a:solidFill>
               </a14:hiddenFill>
             </a:ext>
             <a:ext uri="{91240B29-F687-4f45-9708-019B960494DF}">
-              <a14:hiddenLine xmlns="" xmlns:a14="http://schemas.microsoft.com/office/drawing/2010/main" w="9525">
+              <a14:hiddenLine xmlns:a14="http://schemas.microsoft.com/office/drawing/2010/main" xmlns="" w="9525">
                 <a:solidFill>
                   <a:schemeClr val="tx1"/>
                 </a:solidFill>
@@ -26122,7 +26122,7 @@
               </a14:hiddenLine>
             </a:ext>
             <a:ext uri="{AF507438-7753-43e0-B8FC-AC1667EBCBE1}">
-              <a14:hiddenEffects xmlns="" xmlns:a14="http://schemas.microsoft.com/office/drawing/2010/main">
+              <a14:hiddenEffects xmlns:a14="http://schemas.microsoft.com/office/drawing/2010/main" xmlns="">
                 <a:effectLst>
                   <a:outerShdw blurRad="63500" dist="38099" dir="2700000" algn="ctr" rotWithShape="0">
                     <a:schemeClr val="bg2">
@@ -26133,7 +26133,7 @@
               </a14:hiddenEffects>
             </a:ext>
             <a:ext uri="{FAA26D3D-D897-4be2-8F04-BA451C77F1D7}">
-              <ma14:placeholderFlag xmlns="" xmlns:ma14="http://schemas.microsoft.com/office/mac/drawingml/2011/main" val="1"/>
+              <ma14:placeholderFlag xmlns:ma14="http://schemas.microsoft.com/office/mac/drawingml/2011/main" xmlns="" val="1"/>
             </a:ext>
           </a:extLst>
         </p:spPr>
@@ -26308,7 +26308,7 @@
           <a:noFill/>
           <a:extLst>
             <a:ext uri="{909E8E84-426E-40dd-AFC4-6F175D3DCCD1}">
-              <a14:hiddenFill xmlns="" xmlns:a14="http://schemas.microsoft.com/office/drawing/2010/main">
+              <a14:hiddenFill xmlns:a14="http://schemas.microsoft.com/office/drawing/2010/main" xmlns="">
                 <a:solidFill>
                   <a:srgbClr val="FFFFFF"/>
                 </a:solidFill>
@@ -26338,14 +26338,14 @@
           <a:effectLst/>
           <a:extLst>
             <a:ext uri="{909E8E84-426E-40dd-AFC4-6F175D3DCCD1}">
-              <a14:hiddenFill xmlns="" xmlns:a14="http://schemas.microsoft.com/office/drawing/2010/main">
+              <a14:hiddenFill xmlns:a14="http://schemas.microsoft.com/office/drawing/2010/main" xmlns="">
                 <a:solidFill>
                   <a:schemeClr val="accent1"/>
                 </a:solidFill>
               </a14:hiddenFill>
             </a:ext>
             <a:ext uri="{91240B29-F687-4f45-9708-019B960494DF}">
-              <a14:hiddenLine xmlns="" xmlns:a14="http://schemas.microsoft.com/office/drawing/2010/main" w="9525">
+              <a14:hiddenLine xmlns:a14="http://schemas.microsoft.com/office/drawing/2010/main" xmlns="" w="9525">
                 <a:solidFill>
                   <a:schemeClr val="tx1"/>
                 </a:solidFill>
@@ -26355,7 +26355,7 @@
               </a14:hiddenLine>
             </a:ext>
             <a:ext uri="{AF507438-7753-43e0-B8FC-AC1667EBCBE1}">
-              <a14:hiddenEffects xmlns="" xmlns:a14="http://schemas.microsoft.com/office/drawing/2010/main">
+              <a14:hiddenEffects xmlns:a14="http://schemas.microsoft.com/office/drawing/2010/main" xmlns="">
                 <a:effectLst>
                   <a:outerShdw blurRad="63500" dist="38099" dir="2700000" algn="ctr" rotWithShape="0">
                     <a:schemeClr val="bg2">
@@ -26366,7 +26366,7 @@
               </a14:hiddenEffects>
             </a:ext>
             <a:ext uri="{FAA26D3D-D897-4be2-8F04-BA451C77F1D7}">
-              <ma14:placeholderFlag xmlns="" xmlns:ma14="http://schemas.microsoft.com/office/mac/drawingml/2011/main" val="1"/>
+              <ma14:placeholderFlag xmlns:ma14="http://schemas.microsoft.com/office/mac/drawingml/2011/main" xmlns="" val="1"/>
             </a:ext>
           </a:extLst>
         </p:spPr>
@@ -26569,14 +26569,14 @@
           <a:effectLst/>
           <a:extLst>
             <a:ext uri="{909E8E84-426E-40dd-AFC4-6F175D3DCCD1}">
-              <a14:hiddenFill xmlns="" xmlns:a14="http://schemas.microsoft.com/office/drawing/2010/main">
+              <a14:hiddenFill xmlns:a14="http://schemas.microsoft.com/office/drawing/2010/main" xmlns="">
                 <a:solidFill>
                   <a:schemeClr val="accent1"/>
                 </a:solidFill>
               </a14:hiddenFill>
             </a:ext>
             <a:ext uri="{91240B29-F687-4f45-9708-019B960494DF}">
-              <a14:hiddenLine xmlns="" xmlns:a14="http://schemas.microsoft.com/office/drawing/2010/main" w="9525">
+              <a14:hiddenLine xmlns:a14="http://schemas.microsoft.com/office/drawing/2010/main" xmlns="" w="9525">
                 <a:solidFill>
                   <a:schemeClr val="tx1"/>
                 </a:solidFill>
@@ -26586,7 +26586,7 @@
               </a14:hiddenLine>
             </a:ext>
             <a:ext uri="{AF507438-7753-43e0-B8FC-AC1667EBCBE1}">
-              <a14:hiddenEffects xmlns="" xmlns:a14="http://schemas.microsoft.com/office/drawing/2010/main">
+              <a14:hiddenEffects xmlns:a14="http://schemas.microsoft.com/office/drawing/2010/main" xmlns="">
                 <a:effectLst>
                   <a:outerShdw blurRad="63500" dist="38099" dir="2700000" algn="ctr" rotWithShape="0">
                     <a:schemeClr val="bg2">
@@ -26597,7 +26597,7 @@
               </a14:hiddenEffects>
             </a:ext>
             <a:ext uri="{FAA26D3D-D897-4be2-8F04-BA451C77F1D7}">
-              <ma14:placeholderFlag xmlns="" xmlns:ma14="http://schemas.microsoft.com/office/mac/drawingml/2011/main" val="1"/>
+              <ma14:placeholderFlag xmlns:ma14="http://schemas.microsoft.com/office/mac/drawingml/2011/main" xmlns="" val="1"/>
             </a:ext>
           </a:extLst>
         </p:spPr>
@@ -26726,14 +26726,14 @@
           <a:effectLst/>
           <a:extLst>
             <a:ext uri="{909E8E84-426E-40dd-AFC4-6F175D3DCCD1}">
-              <a14:hiddenFill xmlns="" xmlns:a14="http://schemas.microsoft.com/office/drawing/2010/main">
+              <a14:hiddenFill xmlns:a14="http://schemas.microsoft.com/office/drawing/2010/main" xmlns="">
                 <a:solidFill>
                   <a:schemeClr val="accent1"/>
                 </a:solidFill>
               </a14:hiddenFill>
             </a:ext>
             <a:ext uri="{91240B29-F687-4f45-9708-019B960494DF}">
-              <a14:hiddenLine xmlns="" xmlns:a14="http://schemas.microsoft.com/office/drawing/2010/main" w="9525">
+              <a14:hiddenLine xmlns:a14="http://schemas.microsoft.com/office/drawing/2010/main" xmlns="" w="9525">
                 <a:solidFill>
                   <a:schemeClr val="tx1"/>
                 </a:solidFill>
@@ -26743,7 +26743,7 @@
               </a14:hiddenLine>
             </a:ext>
             <a:ext uri="{AF507438-7753-43e0-B8FC-AC1667EBCBE1}">
-              <a14:hiddenEffects xmlns="" xmlns:a14="http://schemas.microsoft.com/office/drawing/2010/main">
+              <a14:hiddenEffects xmlns:a14="http://schemas.microsoft.com/office/drawing/2010/main" xmlns="">
                 <a:effectLst>
                   <a:outerShdw blurRad="63500" dist="38099" dir="2700000" algn="ctr" rotWithShape="0">
                     <a:schemeClr val="bg2">
@@ -26754,7 +26754,7 @@
               </a14:hiddenEffects>
             </a:ext>
             <a:ext uri="{FAA26D3D-D897-4be2-8F04-BA451C77F1D7}">
-              <ma14:placeholderFlag xmlns="" xmlns:ma14="http://schemas.microsoft.com/office/mac/drawingml/2011/main" val="1"/>
+              <ma14:placeholderFlag xmlns:ma14="http://schemas.microsoft.com/office/mac/drawingml/2011/main" xmlns="" val="1"/>
             </a:ext>
           </a:extLst>
         </p:spPr>
@@ -27249,14 +27249,14 @@
           <a:effectLst/>
           <a:extLst>
             <a:ext uri="{909E8E84-426E-40dd-AFC4-6F175D3DCCD1}">
-              <a14:hiddenFill xmlns="" xmlns:a14="http://schemas.microsoft.com/office/drawing/2010/main">
+              <a14:hiddenFill xmlns:a14="http://schemas.microsoft.com/office/drawing/2010/main" xmlns="">
                 <a:solidFill>
                   <a:schemeClr val="accent1"/>
                 </a:solidFill>
               </a14:hiddenFill>
             </a:ext>
             <a:ext uri="{91240B29-F687-4f45-9708-019B960494DF}">
-              <a14:hiddenLine xmlns="" xmlns:a14="http://schemas.microsoft.com/office/drawing/2010/main" w="9525">
+              <a14:hiddenLine xmlns:a14="http://schemas.microsoft.com/office/drawing/2010/main" xmlns="" w="9525">
                 <a:solidFill>
                   <a:schemeClr val="tx1"/>
                 </a:solidFill>
@@ -27266,7 +27266,7 @@
               </a14:hiddenLine>
             </a:ext>
             <a:ext uri="{AF507438-7753-43e0-B8FC-AC1667EBCBE1}">
-              <a14:hiddenEffects xmlns="" xmlns:a14="http://schemas.microsoft.com/office/drawing/2010/main">
+              <a14:hiddenEffects xmlns:a14="http://schemas.microsoft.com/office/drawing/2010/main" xmlns="">
                 <a:effectLst>
                   <a:outerShdw blurRad="63500" dist="38099" dir="2700000" algn="ctr" rotWithShape="0">
                     <a:schemeClr val="bg2">
@@ -27277,7 +27277,7 @@
               </a14:hiddenEffects>
             </a:ext>
             <a:ext uri="{FAA26D3D-D897-4be2-8F04-BA451C77F1D7}">
-              <ma14:placeholderFlag xmlns="" xmlns:ma14="http://schemas.microsoft.com/office/mac/drawingml/2011/main" val="1"/>
+              <ma14:placeholderFlag xmlns:ma14="http://schemas.microsoft.com/office/mac/drawingml/2011/main" xmlns="" val="1"/>
             </a:ext>
           </a:extLst>
         </p:spPr>
@@ -27435,14 +27435,14 @@
           <a:effectLst/>
           <a:extLst>
             <a:ext uri="{909E8E84-426E-40dd-AFC4-6F175D3DCCD1}">
-              <a14:hiddenFill xmlns="" xmlns:a14="http://schemas.microsoft.com/office/drawing/2010/main">
+              <a14:hiddenFill xmlns:a14="http://schemas.microsoft.com/office/drawing/2010/main" xmlns="">
                 <a:solidFill>
                   <a:schemeClr val="accent1"/>
                 </a:solidFill>
               </a14:hiddenFill>
             </a:ext>
             <a:ext uri="{91240B29-F687-4f45-9708-019B960494DF}">
-              <a14:hiddenLine xmlns="" xmlns:a14="http://schemas.microsoft.com/office/drawing/2010/main" w="9525">
+              <a14:hiddenLine xmlns:a14="http://schemas.microsoft.com/office/drawing/2010/main" xmlns="" w="9525">
                 <a:solidFill>
                   <a:schemeClr val="tx1"/>
                 </a:solidFill>
@@ -27452,7 +27452,7 @@
               </a14:hiddenLine>
             </a:ext>
             <a:ext uri="{AF507438-7753-43e0-B8FC-AC1667EBCBE1}">
-              <a14:hiddenEffects xmlns="" xmlns:a14="http://schemas.microsoft.com/office/drawing/2010/main">
+              <a14:hiddenEffects xmlns:a14="http://schemas.microsoft.com/office/drawing/2010/main" xmlns="">
                 <a:effectLst>
                   <a:outerShdw blurRad="63500" dist="38099" dir="2700000" algn="ctr" rotWithShape="0">
                     <a:schemeClr val="bg2">
@@ -27463,7 +27463,7 @@
               </a14:hiddenEffects>
             </a:ext>
             <a:ext uri="{FAA26D3D-D897-4be2-8F04-BA451C77F1D7}">
-              <ma14:placeholderFlag xmlns="" xmlns:ma14="http://schemas.microsoft.com/office/mac/drawingml/2011/main" val="1"/>
+              <ma14:placeholderFlag xmlns:ma14="http://schemas.microsoft.com/office/mac/drawingml/2011/main" xmlns="" val="1"/>
             </a:ext>
           </a:extLst>
         </p:spPr>
@@ -28295,14 +28295,14 @@
           <a:effectLst/>
           <a:extLst>
             <a:ext uri="{909E8E84-426E-40dd-AFC4-6F175D3DCCD1}">
-              <a14:hiddenFill xmlns="" xmlns:a14="http://schemas.microsoft.com/office/drawing/2010/main">
+              <a14:hiddenFill xmlns:a14="http://schemas.microsoft.com/office/drawing/2010/main" xmlns="">
                 <a:solidFill>
                   <a:schemeClr val="accent1"/>
                 </a:solidFill>
               </a14:hiddenFill>
             </a:ext>
             <a:ext uri="{91240B29-F687-4f45-9708-019B960494DF}">
-              <a14:hiddenLine xmlns="" xmlns:a14="http://schemas.microsoft.com/office/drawing/2010/main" w="9525">
+              <a14:hiddenLine xmlns:a14="http://schemas.microsoft.com/office/drawing/2010/main" xmlns="" w="9525">
                 <a:solidFill>
                   <a:schemeClr val="tx1"/>
                 </a:solidFill>
@@ -28312,7 +28312,7 @@
               </a14:hiddenLine>
             </a:ext>
             <a:ext uri="{AF507438-7753-43e0-B8FC-AC1667EBCBE1}">
-              <a14:hiddenEffects xmlns="" xmlns:a14="http://schemas.microsoft.com/office/drawing/2010/main">
+              <a14:hiddenEffects xmlns:a14="http://schemas.microsoft.com/office/drawing/2010/main" xmlns="">
                 <a:effectLst>
                   <a:outerShdw blurRad="63500" dist="38099" dir="2700000" algn="ctr" rotWithShape="0">
                     <a:schemeClr val="bg2">
@@ -28323,7 +28323,7 @@
               </a14:hiddenEffects>
             </a:ext>
             <a:ext uri="{FAA26D3D-D897-4be2-8F04-BA451C77F1D7}">
-              <ma14:placeholderFlag xmlns="" xmlns:ma14="http://schemas.microsoft.com/office/mac/drawingml/2011/main" val="1"/>
+              <ma14:placeholderFlag xmlns:ma14="http://schemas.microsoft.com/office/mac/drawingml/2011/main" xmlns="" val="1"/>
             </a:ext>
           </a:extLst>
         </p:spPr>
@@ -28494,14 +28494,14 @@
           <a:effectLst/>
           <a:extLst>
             <a:ext uri="{909E8E84-426E-40dd-AFC4-6F175D3DCCD1}">
-              <a14:hiddenFill xmlns="" xmlns:a14="http://schemas.microsoft.com/office/drawing/2010/main">
+              <a14:hiddenFill xmlns:a14="http://schemas.microsoft.com/office/drawing/2010/main" xmlns="">
                 <a:solidFill>
                   <a:schemeClr val="accent1"/>
                 </a:solidFill>
               </a14:hiddenFill>
             </a:ext>
             <a:ext uri="{91240B29-F687-4f45-9708-019B960494DF}">
-              <a14:hiddenLine xmlns="" xmlns:a14="http://schemas.microsoft.com/office/drawing/2010/main" w="9525">
+              <a14:hiddenLine xmlns:a14="http://schemas.microsoft.com/office/drawing/2010/main" xmlns="" w="9525">
                 <a:solidFill>
                   <a:schemeClr val="tx1"/>
                 </a:solidFill>
@@ -28511,7 +28511,7 @@
               </a14:hiddenLine>
             </a:ext>
             <a:ext uri="{AF507438-7753-43e0-B8FC-AC1667EBCBE1}">
-              <a14:hiddenEffects xmlns="" xmlns:a14="http://schemas.microsoft.com/office/drawing/2010/main">
+              <a14:hiddenEffects xmlns:a14="http://schemas.microsoft.com/office/drawing/2010/main" xmlns="">
                 <a:effectLst>
                   <a:outerShdw blurRad="63500" dist="38099" dir="2700000" algn="ctr" rotWithShape="0">
                     <a:schemeClr val="bg2">
@@ -28522,7 +28522,7 @@
               </a14:hiddenEffects>
             </a:ext>
             <a:ext uri="{FAA26D3D-D897-4be2-8F04-BA451C77F1D7}">
-              <ma14:placeholderFlag xmlns="" xmlns:ma14="http://schemas.microsoft.com/office/mac/drawingml/2011/main" val="1"/>
+              <ma14:placeholderFlag xmlns:ma14="http://schemas.microsoft.com/office/mac/drawingml/2011/main" xmlns="" val="1"/>
             </a:ext>
           </a:extLst>
         </p:spPr>
@@ -28784,7 +28784,7 @@
                       <a:noFill/>
                       <a:extLst>
                         <a:ext uri="{909E8E84-426E-40dd-AFC4-6F175D3DCCD1}">
-                          <a14:hiddenFill xmlns="" xmlns:a14="http://schemas.microsoft.com/office/drawing/2010/main">
+                          <a14:hiddenFill xmlns:a14="http://schemas.microsoft.com/office/drawing/2010/main" xmlns="">
                             <a:solidFill>
                               <a:srgbClr val="FFFFFF"/>
                             </a:solidFill>
@@ -30413,14 +30413,14 @@
           <a:effectLst/>
           <a:extLst>
             <a:ext uri="{909E8E84-426E-40dd-AFC4-6F175D3DCCD1}">
-              <a14:hiddenFill xmlns="" xmlns:a14="http://schemas.microsoft.com/office/drawing/2010/main">
+              <a14:hiddenFill xmlns:a14="http://schemas.microsoft.com/office/drawing/2010/main" xmlns="">
                 <a:solidFill>
                   <a:schemeClr val="accent1"/>
                 </a:solidFill>
               </a14:hiddenFill>
             </a:ext>
             <a:ext uri="{91240B29-F687-4f45-9708-019B960494DF}">
-              <a14:hiddenLine xmlns="" xmlns:a14="http://schemas.microsoft.com/office/drawing/2010/main" w="9525">
+              <a14:hiddenLine xmlns:a14="http://schemas.microsoft.com/office/drawing/2010/main" xmlns="" w="9525">
                 <a:solidFill>
                   <a:schemeClr val="tx1"/>
                 </a:solidFill>
@@ -30430,7 +30430,7 @@
               </a14:hiddenLine>
             </a:ext>
             <a:ext uri="{AF507438-7753-43e0-B8FC-AC1667EBCBE1}">
-              <a14:hiddenEffects xmlns="" xmlns:a14="http://schemas.microsoft.com/office/drawing/2010/main">
+              <a14:hiddenEffects xmlns:a14="http://schemas.microsoft.com/office/drawing/2010/main" xmlns="">
                 <a:effectLst>
                   <a:outerShdw blurRad="63500" dist="38099" dir="2700000" algn="ctr" rotWithShape="0">
                     <a:schemeClr val="bg2">
@@ -30441,7 +30441,7 @@
               </a14:hiddenEffects>
             </a:ext>
             <a:ext uri="{FAA26D3D-D897-4be2-8F04-BA451C77F1D7}">
-              <ma14:placeholderFlag xmlns="" xmlns:ma14="http://schemas.microsoft.com/office/mac/drawingml/2011/main" val="1"/>
+              <ma14:placeholderFlag xmlns:ma14="http://schemas.microsoft.com/office/mac/drawingml/2011/main" xmlns="" val="1"/>
             </a:ext>
           </a:extLst>
         </p:spPr>
@@ -30730,7 +30730,7 @@
                       <a:noFill/>
                       <a:extLst>
                         <a:ext uri="{909E8E84-426E-40dd-AFC4-6F175D3DCCD1}">
-                          <a14:hiddenFill xmlns="" xmlns:a14="http://schemas.microsoft.com/office/drawing/2010/main">
+                          <a14:hiddenFill xmlns:a14="http://schemas.microsoft.com/office/drawing/2010/main" xmlns="">
                             <a:solidFill>
                               <a:srgbClr val="FFFFFF"/>
                             </a:solidFill>
@@ -30806,7 +30806,7 @@
                       <a:noFill/>
                       <a:extLst>
                         <a:ext uri="{909E8E84-426E-40dd-AFC4-6F175D3DCCD1}">
-                          <a14:hiddenFill xmlns="" xmlns:a14="http://schemas.microsoft.com/office/drawing/2010/main">
+                          <a14:hiddenFill xmlns:a14="http://schemas.microsoft.com/office/drawing/2010/main" xmlns="">
                             <a:solidFill>
                               <a:srgbClr val="FFFFFF"/>
                             </a:solidFill>
@@ -30882,7 +30882,7 @@
                       <a:noFill/>
                       <a:extLst>
                         <a:ext uri="{909E8E84-426E-40dd-AFC4-6F175D3DCCD1}">
-                          <a14:hiddenFill xmlns="" xmlns:a14="http://schemas.microsoft.com/office/drawing/2010/main">
+                          <a14:hiddenFill xmlns:a14="http://schemas.microsoft.com/office/drawing/2010/main" xmlns="">
                             <a:solidFill>
                               <a:srgbClr val="FFFFFF"/>
                             </a:solidFill>
@@ -31226,14 +31226,14 @@
           <a:effectLst/>
           <a:extLst>
             <a:ext uri="{909E8E84-426E-40dd-AFC4-6F175D3DCCD1}">
-              <a14:hiddenFill xmlns="" xmlns:a14="http://schemas.microsoft.com/office/drawing/2010/main">
+              <a14:hiddenFill xmlns:a14="http://schemas.microsoft.com/office/drawing/2010/main" xmlns="">
                 <a:solidFill>
                   <a:schemeClr val="accent1"/>
                 </a:solidFill>
               </a14:hiddenFill>
             </a:ext>
             <a:ext uri="{91240B29-F687-4f45-9708-019B960494DF}">
-              <a14:hiddenLine xmlns="" xmlns:a14="http://schemas.microsoft.com/office/drawing/2010/main" w="9525">
+              <a14:hiddenLine xmlns:a14="http://schemas.microsoft.com/office/drawing/2010/main" xmlns="" w="9525">
                 <a:solidFill>
                   <a:schemeClr val="tx1"/>
                 </a:solidFill>
@@ -31243,7 +31243,7 @@
               </a14:hiddenLine>
             </a:ext>
             <a:ext uri="{AF507438-7753-43e0-B8FC-AC1667EBCBE1}">
-              <a14:hiddenEffects xmlns="" xmlns:a14="http://schemas.microsoft.com/office/drawing/2010/main">
+              <a14:hiddenEffects xmlns:a14="http://schemas.microsoft.com/office/drawing/2010/main" xmlns="">
                 <a:effectLst>
                   <a:outerShdw blurRad="63500" dist="38099" dir="2700000" algn="ctr" rotWithShape="0">
                     <a:schemeClr val="bg2">
@@ -31254,7 +31254,7 @@
               </a14:hiddenEffects>
             </a:ext>
             <a:ext uri="{FAA26D3D-D897-4be2-8F04-BA451C77F1D7}">
-              <ma14:placeholderFlag xmlns="" xmlns:ma14="http://schemas.microsoft.com/office/mac/drawingml/2011/main" val="1"/>
+              <ma14:placeholderFlag xmlns:ma14="http://schemas.microsoft.com/office/mac/drawingml/2011/main" xmlns="" val="1"/>
             </a:ext>
           </a:extLst>
         </p:spPr>
@@ -31392,7 +31392,7 @@
                       <a:noFill/>
                       <a:extLst>
                         <a:ext uri="{909E8E84-426E-40dd-AFC4-6F175D3DCCD1}">
-                          <a14:hiddenFill xmlns="" xmlns:a14="http://schemas.microsoft.com/office/drawing/2010/main">
+                          <a14:hiddenFill xmlns:a14="http://schemas.microsoft.com/office/drawing/2010/main" xmlns="">
                             <a:solidFill>
                               <a:srgbClr val="FFFFFF"/>
                             </a:solidFill>
@@ -31729,7 +31729,7 @@
                       <a:noFill/>
                       <a:extLst>
                         <a:ext uri="{909E8E84-426E-40dd-AFC4-6F175D3DCCD1}">
-                          <a14:hiddenFill xmlns="" xmlns:a14="http://schemas.microsoft.com/office/drawing/2010/main">
+                          <a14:hiddenFill xmlns:a14="http://schemas.microsoft.com/office/drawing/2010/main" xmlns="">
                             <a:solidFill>
                               <a:srgbClr val="FFFFFF"/>
                             </a:solidFill>
@@ -31815,14 +31815,14 @@
           <a:effectLst/>
           <a:extLst>
             <a:ext uri="{909E8E84-426E-40dd-AFC4-6F175D3DCCD1}">
-              <a14:hiddenFill xmlns="" xmlns:a14="http://schemas.microsoft.com/office/drawing/2010/main">
+              <a14:hiddenFill xmlns:a14="http://schemas.microsoft.com/office/drawing/2010/main" xmlns="">
                 <a:solidFill>
                   <a:schemeClr val="accent1"/>
                 </a:solidFill>
               </a14:hiddenFill>
             </a:ext>
             <a:ext uri="{91240B29-F687-4f45-9708-019B960494DF}">
-              <a14:hiddenLine xmlns="" xmlns:a14="http://schemas.microsoft.com/office/drawing/2010/main" w="9525">
+              <a14:hiddenLine xmlns:a14="http://schemas.microsoft.com/office/drawing/2010/main" xmlns="" w="9525">
                 <a:solidFill>
                   <a:schemeClr val="tx1"/>
                 </a:solidFill>
@@ -31832,7 +31832,7 @@
               </a14:hiddenLine>
             </a:ext>
             <a:ext uri="{AF507438-7753-43e0-B8FC-AC1667EBCBE1}">
-              <a14:hiddenEffects xmlns="" xmlns:a14="http://schemas.microsoft.com/office/drawing/2010/main">
+              <a14:hiddenEffects xmlns:a14="http://schemas.microsoft.com/office/drawing/2010/main" xmlns="">
                 <a:effectLst>
                   <a:outerShdw blurRad="63500" dist="38099" dir="2700000" algn="ctr" rotWithShape="0">
                     <a:schemeClr val="bg2">
@@ -31843,7 +31843,7 @@
               </a14:hiddenEffects>
             </a:ext>
             <a:ext uri="{FAA26D3D-D897-4be2-8F04-BA451C77F1D7}">
-              <ma14:placeholderFlag xmlns="" xmlns:ma14="http://schemas.microsoft.com/office/mac/drawingml/2011/main" val="1"/>
+              <ma14:placeholderFlag xmlns:ma14="http://schemas.microsoft.com/office/mac/drawingml/2011/main" xmlns="" val="1"/>
             </a:ext>
           </a:extLst>
         </p:spPr>
@@ -32257,14 +32257,14 @@
           <a:effectLst/>
           <a:extLst>
             <a:ext uri="{909E8E84-426E-40dd-AFC4-6F175D3DCCD1}">
-              <a14:hiddenFill xmlns="" xmlns:a14="http://schemas.microsoft.com/office/drawing/2010/main">
+              <a14:hiddenFill xmlns:a14="http://schemas.microsoft.com/office/drawing/2010/main" xmlns="">
                 <a:solidFill>
                   <a:schemeClr val="accent1"/>
                 </a:solidFill>
               </a14:hiddenFill>
             </a:ext>
             <a:ext uri="{91240B29-F687-4f45-9708-019B960494DF}">
-              <a14:hiddenLine xmlns="" xmlns:a14="http://schemas.microsoft.com/office/drawing/2010/main" w="9525">
+              <a14:hiddenLine xmlns:a14="http://schemas.microsoft.com/office/drawing/2010/main" xmlns="" w="9525">
                 <a:solidFill>
                   <a:schemeClr val="tx1"/>
                 </a:solidFill>
@@ -32274,7 +32274,7 @@
               </a14:hiddenLine>
             </a:ext>
             <a:ext uri="{AF507438-7753-43e0-B8FC-AC1667EBCBE1}">
-              <a14:hiddenEffects xmlns="" xmlns:a14="http://schemas.microsoft.com/office/drawing/2010/main">
+              <a14:hiddenEffects xmlns:a14="http://schemas.microsoft.com/office/drawing/2010/main" xmlns="">
                 <a:effectLst>
                   <a:outerShdw blurRad="63500" dist="38099" dir="2700000" algn="ctr" rotWithShape="0">
                     <a:schemeClr val="bg2">
@@ -32285,7 +32285,7 @@
               </a14:hiddenEffects>
             </a:ext>
             <a:ext uri="{FAA26D3D-D897-4be2-8F04-BA451C77F1D7}">
-              <ma14:placeholderFlag xmlns="" xmlns:ma14="http://schemas.microsoft.com/office/mac/drawingml/2011/main" val="1"/>
+              <ma14:placeholderFlag xmlns:ma14="http://schemas.microsoft.com/office/mac/drawingml/2011/main" xmlns="" val="1"/>
             </a:ext>
           </a:extLst>
         </p:spPr>
@@ -32537,7 +32537,7 @@
                       <a:noFill/>
                       <a:extLst>
                         <a:ext uri="{909E8E84-426E-40dd-AFC4-6F175D3DCCD1}">
-                          <a14:hiddenFill xmlns="" xmlns:a14="http://schemas.microsoft.com/office/drawing/2010/main">
+                          <a14:hiddenFill xmlns:a14="http://schemas.microsoft.com/office/drawing/2010/main" xmlns="">
                             <a:solidFill>
                               <a:srgbClr val="FFFFFF"/>
                             </a:solidFill>
@@ -32607,7 +32607,7 @@
                       <a:noFill/>
                       <a:extLst>
                         <a:ext uri="{909E8E84-426E-40dd-AFC4-6F175D3DCCD1}">
-                          <a14:hiddenFill xmlns="" xmlns:a14="http://schemas.microsoft.com/office/drawing/2010/main">
+                          <a14:hiddenFill xmlns:a14="http://schemas.microsoft.com/office/drawing/2010/main" xmlns="">
                             <a:solidFill>
                               <a:srgbClr val="FFFFFF"/>
                             </a:solidFill>
@@ -32677,7 +32677,7 @@
                       <a:noFill/>
                       <a:extLst>
                         <a:ext uri="{909E8E84-426E-40dd-AFC4-6F175D3DCCD1}">
-                          <a14:hiddenFill xmlns="" xmlns:a14="http://schemas.microsoft.com/office/drawing/2010/main">
+                          <a14:hiddenFill xmlns:a14="http://schemas.microsoft.com/office/drawing/2010/main" xmlns="">
                             <a:solidFill>
                               <a:srgbClr val="FFFFFF"/>
                             </a:solidFill>
@@ -33030,14 +33030,14 @@
           <a:effectLst/>
           <a:extLst>
             <a:ext uri="{909E8E84-426E-40dd-AFC4-6F175D3DCCD1}">
-              <a14:hiddenFill xmlns="" xmlns:a14="http://schemas.microsoft.com/office/drawing/2010/main">
+              <a14:hiddenFill xmlns:a14="http://schemas.microsoft.com/office/drawing/2010/main" xmlns="">
                 <a:solidFill>
                   <a:schemeClr val="accent1"/>
                 </a:solidFill>
               </a14:hiddenFill>
             </a:ext>
             <a:ext uri="{91240B29-F687-4f45-9708-019B960494DF}">
-              <a14:hiddenLine xmlns="" xmlns:a14="http://schemas.microsoft.com/office/drawing/2010/main" w="9525">
+              <a14:hiddenLine xmlns:a14="http://schemas.microsoft.com/office/drawing/2010/main" xmlns="" w="9525">
                 <a:solidFill>
                   <a:schemeClr val="tx1"/>
                 </a:solidFill>
@@ -33047,7 +33047,7 @@
               </a14:hiddenLine>
             </a:ext>
             <a:ext uri="{AF507438-7753-43e0-B8FC-AC1667EBCBE1}">
-              <a14:hiddenEffects xmlns="" xmlns:a14="http://schemas.microsoft.com/office/drawing/2010/main">
+              <a14:hiddenEffects xmlns:a14="http://schemas.microsoft.com/office/drawing/2010/main" xmlns="">
                 <a:effectLst>
                   <a:outerShdw blurRad="63500" dist="38099" dir="2700000" algn="ctr" rotWithShape="0">
                     <a:schemeClr val="bg2">
@@ -33058,7 +33058,7 @@
               </a14:hiddenEffects>
             </a:ext>
             <a:ext uri="{FAA26D3D-D897-4be2-8F04-BA451C77F1D7}">
-              <ma14:placeholderFlag xmlns="" xmlns:ma14="http://schemas.microsoft.com/office/mac/drawingml/2011/main" val="1"/>
+              <ma14:placeholderFlag xmlns:ma14="http://schemas.microsoft.com/office/mac/drawingml/2011/main" xmlns="" val="1"/>
             </a:ext>
           </a:extLst>
         </p:spPr>
@@ -33283,7 +33283,7 @@
                       <a:noFill/>
                       <a:extLst>
                         <a:ext uri="{909E8E84-426E-40dd-AFC4-6F175D3DCCD1}">
-                          <a14:hiddenFill xmlns="" xmlns:a14="http://schemas.microsoft.com/office/drawing/2010/main">
+                          <a14:hiddenFill xmlns:a14="http://schemas.microsoft.com/office/drawing/2010/main" xmlns="">
                             <a:solidFill>
                               <a:srgbClr val="FFFFFF"/>
                             </a:solidFill>
@@ -33503,7 +33503,7 @@
                       <a:noFill/>
                       <a:extLst>
                         <a:ext uri="{909E8E84-426E-40dd-AFC4-6F175D3DCCD1}">
-                          <a14:hiddenFill xmlns="" xmlns:a14="http://schemas.microsoft.com/office/drawing/2010/main">
+                          <a14:hiddenFill xmlns:a14="http://schemas.microsoft.com/office/drawing/2010/main" xmlns="">
                             <a:solidFill>
                               <a:srgbClr val="FFFFFF"/>
                             </a:solidFill>
@@ -33643,14 +33643,14 @@
           <a:effectLst/>
           <a:extLst>
             <a:ext uri="{909E8E84-426E-40dd-AFC4-6F175D3DCCD1}">
-              <a14:hiddenFill xmlns="" xmlns:a14="http://schemas.microsoft.com/office/drawing/2010/main">
+              <a14:hiddenFill xmlns:a14="http://schemas.microsoft.com/office/drawing/2010/main" xmlns="">
                 <a:solidFill>
                   <a:schemeClr val="accent1"/>
                 </a:solidFill>
               </a14:hiddenFill>
             </a:ext>
             <a:ext uri="{91240B29-F687-4f45-9708-019B960494DF}">
-              <a14:hiddenLine xmlns="" xmlns:a14="http://schemas.microsoft.com/office/drawing/2010/main" w="9525">
+              <a14:hiddenLine xmlns:a14="http://schemas.microsoft.com/office/drawing/2010/main" xmlns="" w="9525">
                 <a:solidFill>
                   <a:schemeClr val="tx1"/>
                 </a:solidFill>
@@ -33660,7 +33660,7 @@
               </a14:hiddenLine>
             </a:ext>
             <a:ext uri="{AF507438-7753-43e0-B8FC-AC1667EBCBE1}">
-              <a14:hiddenEffects xmlns="" xmlns:a14="http://schemas.microsoft.com/office/drawing/2010/main">
+              <a14:hiddenEffects xmlns:a14="http://schemas.microsoft.com/office/drawing/2010/main" xmlns="">
                 <a:effectLst>
                   <a:outerShdw dist="35921" dir="2700000" algn="ctr" rotWithShape="0">
                     <a:schemeClr val="bg2"/>
@@ -33692,14 +33692,14 @@
           <a:effectLst/>
           <a:extLst>
             <a:ext uri="{909E8E84-426E-40dd-AFC4-6F175D3DCCD1}">
-              <a14:hiddenFill xmlns="" xmlns:a14="http://schemas.microsoft.com/office/drawing/2010/main">
+              <a14:hiddenFill xmlns:a14="http://schemas.microsoft.com/office/drawing/2010/main" xmlns="">
                 <a:solidFill>
                   <a:schemeClr val="accent1"/>
                 </a:solidFill>
               </a14:hiddenFill>
             </a:ext>
             <a:ext uri="{91240B29-F687-4f45-9708-019B960494DF}">
-              <a14:hiddenLine xmlns="" xmlns:a14="http://schemas.microsoft.com/office/drawing/2010/main" w="9525">
+              <a14:hiddenLine xmlns:a14="http://schemas.microsoft.com/office/drawing/2010/main" xmlns="" w="9525">
                 <a:solidFill>
                   <a:schemeClr val="tx1"/>
                 </a:solidFill>
@@ -33709,7 +33709,7 @@
               </a14:hiddenLine>
             </a:ext>
             <a:ext uri="{AF507438-7753-43e0-B8FC-AC1667EBCBE1}">
-              <a14:hiddenEffects xmlns="" xmlns:a14="http://schemas.microsoft.com/office/drawing/2010/main">
+              <a14:hiddenEffects xmlns:a14="http://schemas.microsoft.com/office/drawing/2010/main" xmlns="">
                 <a:effectLst>
                   <a:outerShdw blurRad="63500" dist="38099" dir="2700000" algn="ctr" rotWithShape="0">
                     <a:schemeClr val="bg2">
@@ -33720,7 +33720,7 @@
               </a14:hiddenEffects>
             </a:ext>
             <a:ext uri="{FAA26D3D-D897-4be2-8F04-BA451C77F1D7}">
-              <ma14:placeholderFlag xmlns="" xmlns:ma14="http://schemas.microsoft.com/office/mac/drawingml/2011/main" val="1"/>
+              <ma14:placeholderFlag xmlns:ma14="http://schemas.microsoft.com/office/mac/drawingml/2011/main" xmlns="" val="1"/>
             </a:ext>
           </a:extLst>
         </p:spPr>
@@ -33947,14 +33947,14 @@
           <a:effectLst/>
           <a:extLst>
             <a:ext uri="{909E8E84-426E-40dd-AFC4-6F175D3DCCD1}">
-              <a14:hiddenFill xmlns="" xmlns:a14="http://schemas.microsoft.com/office/drawing/2010/main">
+              <a14:hiddenFill xmlns:a14="http://schemas.microsoft.com/office/drawing/2010/main" xmlns="">
                 <a:solidFill>
                   <a:schemeClr val="accent1"/>
                 </a:solidFill>
               </a14:hiddenFill>
             </a:ext>
             <a:ext uri="{91240B29-F687-4f45-9708-019B960494DF}">
-              <a14:hiddenLine xmlns="" xmlns:a14="http://schemas.microsoft.com/office/drawing/2010/main" w="9525">
+              <a14:hiddenLine xmlns:a14="http://schemas.microsoft.com/office/drawing/2010/main" xmlns="" w="9525">
                 <a:solidFill>
                   <a:schemeClr val="tx1"/>
                 </a:solidFill>
@@ -33964,7 +33964,7 @@
               </a14:hiddenLine>
             </a:ext>
             <a:ext uri="{AF507438-7753-43e0-B8FC-AC1667EBCBE1}">
-              <a14:hiddenEffects xmlns="" xmlns:a14="http://schemas.microsoft.com/office/drawing/2010/main">
+              <a14:hiddenEffects xmlns:a14="http://schemas.microsoft.com/office/drawing/2010/main" xmlns="">
                 <a:effectLst>
                   <a:outerShdw blurRad="63500" dist="38099" dir="2700000" algn="ctr" rotWithShape="0">
                     <a:schemeClr val="bg2">
@@ -33975,7 +33975,7 @@
               </a14:hiddenEffects>
             </a:ext>
             <a:ext uri="{FAA26D3D-D897-4be2-8F04-BA451C77F1D7}">
-              <ma14:placeholderFlag xmlns="" xmlns:ma14="http://schemas.microsoft.com/office/mac/drawingml/2011/main" val="1"/>
+              <ma14:placeholderFlag xmlns:ma14="http://schemas.microsoft.com/office/mac/drawingml/2011/main" xmlns="" val="1"/>
             </a:ext>
           </a:extLst>
         </p:spPr>
@@ -34206,7 +34206,7 @@
           <a:noFill/>
           <a:extLst>
             <a:ext uri="{909E8E84-426E-40dd-AFC4-6F175D3DCCD1}">
-              <a14:hiddenFill xmlns="" xmlns:a14="http://schemas.microsoft.com/office/drawing/2010/main">
+              <a14:hiddenFill xmlns:a14="http://schemas.microsoft.com/office/drawing/2010/main" xmlns="">
                 <a:solidFill>
                   <a:srgbClr val="FFFFFF"/>
                 </a:solidFill>
@@ -34236,14 +34236,14 @@
           <a:effectLst/>
           <a:extLst>
             <a:ext uri="{909E8E84-426E-40dd-AFC4-6F175D3DCCD1}">
-              <a14:hiddenFill xmlns="" xmlns:a14="http://schemas.microsoft.com/office/drawing/2010/main">
+              <a14:hiddenFill xmlns:a14="http://schemas.microsoft.com/office/drawing/2010/main" xmlns="">
                 <a:solidFill>
                   <a:schemeClr val="accent1"/>
                 </a:solidFill>
               </a14:hiddenFill>
             </a:ext>
             <a:ext uri="{91240B29-F687-4f45-9708-019B960494DF}">
-              <a14:hiddenLine xmlns="" xmlns:a14="http://schemas.microsoft.com/office/drawing/2010/main" w="9525">
+              <a14:hiddenLine xmlns:a14="http://schemas.microsoft.com/office/drawing/2010/main" xmlns="" w="9525">
                 <a:solidFill>
                   <a:schemeClr val="tx1"/>
                 </a:solidFill>
@@ -34253,7 +34253,7 @@
               </a14:hiddenLine>
             </a:ext>
             <a:ext uri="{AF507438-7753-43e0-B8FC-AC1667EBCBE1}">
-              <a14:hiddenEffects xmlns="" xmlns:a14="http://schemas.microsoft.com/office/drawing/2010/main">
+              <a14:hiddenEffects xmlns:a14="http://schemas.microsoft.com/office/drawing/2010/main" xmlns="">
                 <a:effectLst>
                   <a:outerShdw blurRad="63500" dist="38099" dir="2700000" algn="ctr" rotWithShape="0">
                     <a:schemeClr val="bg2">
@@ -34264,7 +34264,7 @@
               </a14:hiddenEffects>
             </a:ext>
             <a:ext uri="{FAA26D3D-D897-4be2-8F04-BA451C77F1D7}">
-              <ma14:placeholderFlag xmlns="" xmlns:ma14="http://schemas.microsoft.com/office/mac/drawingml/2011/main" val="1"/>
+              <ma14:placeholderFlag xmlns:ma14="http://schemas.microsoft.com/office/mac/drawingml/2011/main" xmlns="" val="1"/>
             </a:ext>
           </a:extLst>
         </p:spPr>
@@ -34416,14 +34416,14 @@
             </a:ln>
             <a:extLst>
               <a:ext uri="{909E8E84-426E-40dd-AFC4-6F175D3DCCD1}">
-                <a14:hiddenFill xmlns="" xmlns:a14="http://schemas.microsoft.com/office/drawing/2010/main">
+                <a14:hiddenFill xmlns:a14="http://schemas.microsoft.com/office/drawing/2010/main" xmlns="">
                   <a:solidFill>
                     <a:srgbClr val="FFFFFF"/>
                   </a:solidFill>
                 </a14:hiddenFill>
               </a:ext>
               <a:ext uri="{91240B29-F687-4f45-9708-019B960494DF}">
-                <a14:hiddenLine xmlns="" xmlns:a14="http://schemas.microsoft.com/office/drawing/2010/main" w="9525">
+                <a14:hiddenLine xmlns:a14="http://schemas.microsoft.com/office/drawing/2010/main" xmlns="" w="9525">
                   <a:solidFill>
                     <a:srgbClr val="000000"/>
                   </a:solidFill>
@@ -34479,14 +34479,14 @@
             </a:ln>
             <a:extLst>
               <a:ext uri="{909E8E84-426E-40dd-AFC4-6F175D3DCCD1}">
-                <a14:hiddenFill xmlns="" xmlns:a14="http://schemas.microsoft.com/office/drawing/2010/main">
+                <a14:hiddenFill xmlns:a14="http://schemas.microsoft.com/office/drawing/2010/main" xmlns="">
                   <a:solidFill>
                     <a:srgbClr val="FFFFFF"/>
                   </a:solidFill>
                 </a14:hiddenFill>
               </a:ext>
               <a:ext uri="{91240B29-F687-4f45-9708-019B960494DF}">
-                <a14:hiddenLine xmlns="" xmlns:a14="http://schemas.microsoft.com/office/drawing/2010/main" w="9525">
+                <a14:hiddenLine xmlns:a14="http://schemas.microsoft.com/office/drawing/2010/main" xmlns="" w="9525">
                   <a:solidFill>
                     <a:srgbClr val="000000"/>
                   </a:solidFill>
@@ -34542,14 +34542,14 @@
             </a:ln>
             <a:extLst>
               <a:ext uri="{909E8E84-426E-40dd-AFC4-6F175D3DCCD1}">
-                <a14:hiddenFill xmlns="" xmlns:a14="http://schemas.microsoft.com/office/drawing/2010/main">
+                <a14:hiddenFill xmlns:a14="http://schemas.microsoft.com/office/drawing/2010/main" xmlns="">
                   <a:solidFill>
                     <a:srgbClr val="FFFFFF"/>
                   </a:solidFill>
                 </a14:hiddenFill>
               </a:ext>
               <a:ext uri="{91240B29-F687-4f45-9708-019B960494DF}">
-                <a14:hiddenLine xmlns="" xmlns:a14="http://schemas.microsoft.com/office/drawing/2010/main" w="9525">
+                <a14:hiddenLine xmlns:a14="http://schemas.microsoft.com/office/drawing/2010/main" xmlns="" w="9525">
                   <a:solidFill>
                     <a:srgbClr val="000000"/>
                   </a:solidFill>
@@ -34605,14 +34605,14 @@
             </a:ln>
             <a:extLst>
               <a:ext uri="{909E8E84-426E-40dd-AFC4-6F175D3DCCD1}">
-                <a14:hiddenFill xmlns="" xmlns:a14="http://schemas.microsoft.com/office/drawing/2010/main">
+                <a14:hiddenFill xmlns:a14="http://schemas.microsoft.com/office/drawing/2010/main" xmlns="">
                   <a:solidFill>
                     <a:srgbClr val="FFFFFF"/>
                   </a:solidFill>
                 </a14:hiddenFill>
               </a:ext>
               <a:ext uri="{91240B29-F687-4f45-9708-019B960494DF}">
-                <a14:hiddenLine xmlns="" xmlns:a14="http://schemas.microsoft.com/office/drawing/2010/main" w="9525">
+                <a14:hiddenLine xmlns:a14="http://schemas.microsoft.com/office/drawing/2010/main" xmlns="" w="9525">
                   <a:solidFill>
                     <a:srgbClr val="000000"/>
                   </a:solidFill>
@@ -34669,14 +34669,14 @@
             </a:ln>
             <a:extLst>
               <a:ext uri="{909E8E84-426E-40dd-AFC4-6F175D3DCCD1}">
-                <a14:hiddenFill xmlns="" xmlns:a14="http://schemas.microsoft.com/office/drawing/2010/main">
+                <a14:hiddenFill xmlns:a14="http://schemas.microsoft.com/office/drawing/2010/main" xmlns="">
                   <a:solidFill>
                     <a:srgbClr val="FFFFFF"/>
                   </a:solidFill>
                 </a14:hiddenFill>
               </a:ext>
               <a:ext uri="{91240B29-F687-4f45-9708-019B960494DF}">
-                <a14:hiddenLine xmlns="" xmlns:a14="http://schemas.microsoft.com/office/drawing/2010/main" w="9525">
+                <a14:hiddenLine xmlns:a14="http://schemas.microsoft.com/office/drawing/2010/main" xmlns="" w="9525">
                   <a:solidFill>
                     <a:srgbClr val="000000"/>
                   </a:solidFill>
@@ -34741,7 +34741,7 @@
             <a:effectLst/>
             <a:extLst>
               <a:ext uri="{AF507438-7753-43e0-B8FC-AC1667EBCBE1}">
-                <a14:hiddenEffects xmlns="" xmlns:a14="http://schemas.microsoft.com/office/drawing/2010/main">
+                <a14:hiddenEffects xmlns:a14="http://schemas.microsoft.com/office/drawing/2010/main" xmlns="">
                   <a:effectLst>
                     <a:outerShdw blurRad="63500" dist="38099" dir="2700000" algn="ctr" rotWithShape="0">
                       <a:schemeClr val="bg2">
@@ -34792,7 +34792,7 @@
             <a:effectLst/>
             <a:extLst>
               <a:ext uri="{AF507438-7753-43e0-B8FC-AC1667EBCBE1}">
-                <a14:hiddenEffects xmlns="" xmlns:a14="http://schemas.microsoft.com/office/drawing/2010/main">
+                <a14:hiddenEffects xmlns:a14="http://schemas.microsoft.com/office/drawing/2010/main" xmlns="">
                   <a:effectLst>
                     <a:outerShdw blurRad="63500" dist="38099" dir="2700000" algn="ctr" rotWithShape="0">
                       <a:schemeClr val="bg2">
@@ -34842,7 +34842,7 @@
             <a:effectLst/>
             <a:extLst>
               <a:ext uri="{AF507438-7753-43e0-B8FC-AC1667EBCBE1}">
-                <a14:hiddenEffects xmlns="" xmlns:a14="http://schemas.microsoft.com/office/drawing/2010/main">
+                <a14:hiddenEffects xmlns:a14="http://schemas.microsoft.com/office/drawing/2010/main" xmlns="">
                   <a:effectLst>
                     <a:outerShdw blurRad="63500" dist="38099" dir="2700000" algn="ctr" rotWithShape="0">
                       <a:schemeClr val="bg2">
@@ -34892,7 +34892,7 @@
             <a:effectLst/>
             <a:extLst>
               <a:ext uri="{AF507438-7753-43e0-B8FC-AC1667EBCBE1}">
-                <a14:hiddenEffects xmlns="" xmlns:a14="http://schemas.microsoft.com/office/drawing/2010/main">
+                <a14:hiddenEffects xmlns:a14="http://schemas.microsoft.com/office/drawing/2010/main" xmlns="">
                   <a:effectLst>
                     <a:outerShdw blurRad="63500" dist="38099" dir="2700000" algn="ctr" rotWithShape="0">
                       <a:schemeClr val="bg2">
@@ -34942,7 +34942,7 @@
             <a:effectLst/>
             <a:extLst>
               <a:ext uri="{AF507438-7753-43e0-B8FC-AC1667EBCBE1}">
-                <a14:hiddenEffects xmlns="" xmlns:a14="http://schemas.microsoft.com/office/drawing/2010/main">
+                <a14:hiddenEffects xmlns:a14="http://schemas.microsoft.com/office/drawing/2010/main" xmlns="">
                   <a:effectLst>
                     <a:outerShdw blurRad="63500" dist="38099" dir="2700000" algn="ctr" rotWithShape="0">
                       <a:schemeClr val="bg2">
@@ -34992,7 +34992,7 @@
             <a:effectLst/>
             <a:extLst>
               <a:ext uri="{AF507438-7753-43e0-B8FC-AC1667EBCBE1}">
-                <a14:hiddenEffects xmlns="" xmlns:a14="http://schemas.microsoft.com/office/drawing/2010/main">
+                <a14:hiddenEffects xmlns:a14="http://schemas.microsoft.com/office/drawing/2010/main" xmlns="">
                   <a:effectLst>
                     <a:outerShdw blurRad="63500" dist="38099" dir="2700000" algn="ctr" rotWithShape="0">
                       <a:schemeClr val="bg2">
@@ -35042,7 +35042,7 @@
             <a:effectLst/>
             <a:extLst>
               <a:ext uri="{AF507438-7753-43e0-B8FC-AC1667EBCBE1}">
-                <a14:hiddenEffects xmlns="" xmlns:a14="http://schemas.microsoft.com/office/drawing/2010/main">
+                <a14:hiddenEffects xmlns:a14="http://schemas.microsoft.com/office/drawing/2010/main" xmlns="">
                   <a:effectLst>
                     <a:outerShdw blurRad="63500" dist="38099" dir="2700000" algn="ctr" rotWithShape="0">
                       <a:schemeClr val="bg2">
@@ -35092,7 +35092,7 @@
             <a:effectLst/>
             <a:extLst>
               <a:ext uri="{AF507438-7753-43e0-B8FC-AC1667EBCBE1}">
-                <a14:hiddenEffects xmlns="" xmlns:a14="http://schemas.microsoft.com/office/drawing/2010/main">
+                <a14:hiddenEffects xmlns:a14="http://schemas.microsoft.com/office/drawing/2010/main" xmlns="">
                   <a:effectLst>
                     <a:outerShdw blurRad="63500" dist="38099" dir="2700000" algn="ctr" rotWithShape="0">
                       <a:schemeClr val="bg2">
@@ -35142,7 +35142,7 @@
             <a:effectLst/>
             <a:extLst>
               <a:ext uri="{AF507438-7753-43e0-B8FC-AC1667EBCBE1}">
-                <a14:hiddenEffects xmlns="" xmlns:a14="http://schemas.microsoft.com/office/drawing/2010/main">
+                <a14:hiddenEffects xmlns:a14="http://schemas.microsoft.com/office/drawing/2010/main" xmlns="">
                   <a:effectLst>
                     <a:outerShdw blurRad="63500" dist="38099" dir="2700000" algn="ctr" rotWithShape="0">
                       <a:schemeClr val="bg2">
@@ -35192,7 +35192,7 @@
             <a:effectLst/>
             <a:extLst>
               <a:ext uri="{AF507438-7753-43e0-B8FC-AC1667EBCBE1}">
-                <a14:hiddenEffects xmlns="" xmlns:a14="http://schemas.microsoft.com/office/drawing/2010/main">
+                <a14:hiddenEffects xmlns:a14="http://schemas.microsoft.com/office/drawing/2010/main" xmlns="">
                   <a:effectLst>
                     <a:outerShdw blurRad="63500" dist="38099" dir="2700000" algn="ctr" rotWithShape="0">
                       <a:schemeClr val="bg2">
@@ -35242,7 +35242,7 @@
             <a:effectLst/>
             <a:extLst>
               <a:ext uri="{AF507438-7753-43e0-B8FC-AC1667EBCBE1}">
-                <a14:hiddenEffects xmlns="" xmlns:a14="http://schemas.microsoft.com/office/drawing/2010/main">
+                <a14:hiddenEffects xmlns:a14="http://schemas.microsoft.com/office/drawing/2010/main" xmlns="">
                   <a:effectLst>
                     <a:outerShdw blurRad="63500" dist="38099" dir="2700000" algn="ctr" rotWithShape="0">
                       <a:schemeClr val="bg2">
@@ -35292,7 +35292,7 @@
             <a:effectLst/>
             <a:extLst>
               <a:ext uri="{AF507438-7753-43e0-B8FC-AC1667EBCBE1}">
-                <a14:hiddenEffects xmlns="" xmlns:a14="http://schemas.microsoft.com/office/drawing/2010/main">
+                <a14:hiddenEffects xmlns:a14="http://schemas.microsoft.com/office/drawing/2010/main" xmlns="">
                   <a:effectLst>
                     <a:outerShdw blurRad="63500" dist="38099" dir="2700000" algn="ctr" rotWithShape="0">
                       <a:schemeClr val="bg2">
@@ -35342,7 +35342,7 @@
             <a:effectLst/>
             <a:extLst>
               <a:ext uri="{AF507438-7753-43e0-B8FC-AC1667EBCBE1}">
-                <a14:hiddenEffects xmlns="" xmlns:a14="http://schemas.microsoft.com/office/drawing/2010/main">
+                <a14:hiddenEffects xmlns:a14="http://schemas.microsoft.com/office/drawing/2010/main" xmlns="">
                   <a:effectLst>
                     <a:outerShdw blurRad="63500" dist="38099" dir="2700000" algn="ctr" rotWithShape="0">
                       <a:schemeClr val="bg2">
@@ -35392,7 +35392,7 @@
             <a:effectLst/>
             <a:extLst>
               <a:ext uri="{AF507438-7753-43e0-B8FC-AC1667EBCBE1}">
-                <a14:hiddenEffects xmlns="" xmlns:a14="http://schemas.microsoft.com/office/drawing/2010/main">
+                <a14:hiddenEffects xmlns:a14="http://schemas.microsoft.com/office/drawing/2010/main" xmlns="">
                   <a:effectLst>
                     <a:outerShdw blurRad="63500" dist="38099" dir="2700000" algn="ctr" rotWithShape="0">
                       <a:schemeClr val="bg2">
@@ -35442,7 +35442,7 @@
             <a:effectLst/>
             <a:extLst>
               <a:ext uri="{AF507438-7753-43e0-B8FC-AC1667EBCBE1}">
-                <a14:hiddenEffects xmlns="" xmlns:a14="http://schemas.microsoft.com/office/drawing/2010/main">
+                <a14:hiddenEffects xmlns:a14="http://schemas.microsoft.com/office/drawing/2010/main" xmlns="">
                   <a:effectLst>
                     <a:outerShdw blurRad="63500" dist="38099" dir="2700000" algn="ctr" rotWithShape="0">
                       <a:schemeClr val="bg2">
@@ -35492,7 +35492,7 @@
             <a:effectLst/>
             <a:extLst>
               <a:ext uri="{AF507438-7753-43e0-B8FC-AC1667EBCBE1}">
-                <a14:hiddenEffects xmlns="" xmlns:a14="http://schemas.microsoft.com/office/drawing/2010/main">
+                <a14:hiddenEffects xmlns:a14="http://schemas.microsoft.com/office/drawing/2010/main" xmlns="">
                   <a:effectLst>
                     <a:outerShdw blurRad="63500" dist="38099" dir="2700000" algn="ctr" rotWithShape="0">
                       <a:schemeClr val="bg2">
@@ -35542,7 +35542,7 @@
             <a:effectLst/>
             <a:extLst>
               <a:ext uri="{AF507438-7753-43e0-B8FC-AC1667EBCBE1}">
-                <a14:hiddenEffects xmlns="" xmlns:a14="http://schemas.microsoft.com/office/drawing/2010/main">
+                <a14:hiddenEffects xmlns:a14="http://schemas.microsoft.com/office/drawing/2010/main" xmlns="">
                   <a:effectLst>
                     <a:outerShdw blurRad="63500" dist="38099" dir="2700000" algn="ctr" rotWithShape="0">
                       <a:schemeClr val="bg2">
@@ -35584,14 +35584,14 @@
           <a:effectLst/>
           <a:extLst>
             <a:ext uri="{909E8E84-426E-40dd-AFC4-6F175D3DCCD1}">
-              <a14:hiddenFill xmlns="" xmlns:a14="http://schemas.microsoft.com/office/drawing/2010/main">
+              <a14:hiddenFill xmlns:a14="http://schemas.microsoft.com/office/drawing/2010/main" xmlns="">
                 <a:solidFill>
                   <a:schemeClr val="accent1"/>
                 </a:solidFill>
               </a14:hiddenFill>
             </a:ext>
             <a:ext uri="{91240B29-F687-4f45-9708-019B960494DF}">
-              <a14:hiddenLine xmlns="" xmlns:a14="http://schemas.microsoft.com/office/drawing/2010/main" w="9525">
+              <a14:hiddenLine xmlns:a14="http://schemas.microsoft.com/office/drawing/2010/main" xmlns="" w="9525">
                 <a:solidFill>
                   <a:schemeClr val="tx1"/>
                 </a:solidFill>
@@ -35601,7 +35601,7 @@
               </a14:hiddenLine>
             </a:ext>
             <a:ext uri="{AF507438-7753-43e0-B8FC-AC1667EBCBE1}">
-              <a14:hiddenEffects xmlns="" xmlns:a14="http://schemas.microsoft.com/office/drawing/2010/main">
+              <a14:hiddenEffects xmlns:a14="http://schemas.microsoft.com/office/drawing/2010/main" xmlns="">
                 <a:effectLst>
                   <a:outerShdw blurRad="63500" dist="38099" dir="2700000" algn="ctr" rotWithShape="0">
                     <a:schemeClr val="bg2">
@@ -35612,7 +35612,7 @@
               </a14:hiddenEffects>
             </a:ext>
             <a:ext uri="{FAA26D3D-D897-4be2-8F04-BA451C77F1D7}">
-              <ma14:placeholderFlag xmlns="" xmlns:ma14="http://schemas.microsoft.com/office/mac/drawingml/2011/main" val="1"/>
+              <ma14:placeholderFlag xmlns:ma14="http://schemas.microsoft.com/office/mac/drawingml/2011/main" xmlns="" val="1"/>
             </a:ext>
           </a:extLst>
         </p:spPr>
@@ -35770,14 +35770,14 @@
             </a:ln>
             <a:extLst>
               <a:ext uri="{909E8E84-426E-40dd-AFC4-6F175D3DCCD1}">
-                <a14:hiddenFill xmlns="" xmlns:a14="http://schemas.microsoft.com/office/drawing/2010/main">
+                <a14:hiddenFill xmlns:a14="http://schemas.microsoft.com/office/drawing/2010/main" xmlns="">
                   <a:solidFill>
                     <a:srgbClr val="FFFFFF"/>
                   </a:solidFill>
                 </a14:hiddenFill>
               </a:ext>
               <a:ext uri="{91240B29-F687-4f45-9708-019B960494DF}">
-                <a14:hiddenLine xmlns="" xmlns:a14="http://schemas.microsoft.com/office/drawing/2010/main" w="9525">
+                <a14:hiddenLine xmlns:a14="http://schemas.microsoft.com/office/drawing/2010/main" xmlns="" w="9525">
                   <a:solidFill>
                     <a:srgbClr val="000000"/>
                   </a:solidFill>
@@ -35833,14 +35833,14 @@
             </a:ln>
             <a:extLst>
               <a:ext uri="{909E8E84-426E-40dd-AFC4-6F175D3DCCD1}">
-                <a14:hiddenFill xmlns="" xmlns:a14="http://schemas.microsoft.com/office/drawing/2010/main">
+                <a14:hiddenFill xmlns:a14="http://schemas.microsoft.com/office/drawing/2010/main" xmlns="">
                   <a:solidFill>
                     <a:srgbClr val="FFFFFF"/>
                   </a:solidFill>
                 </a14:hiddenFill>
               </a:ext>
               <a:ext uri="{91240B29-F687-4f45-9708-019B960494DF}">
-                <a14:hiddenLine xmlns="" xmlns:a14="http://schemas.microsoft.com/office/drawing/2010/main" w="9525">
+                <a14:hiddenLine xmlns:a14="http://schemas.microsoft.com/office/drawing/2010/main" xmlns="" w="9525">
                   <a:solidFill>
                     <a:srgbClr val="000000"/>
                   </a:solidFill>
@@ -35896,14 +35896,14 @@
             </a:ln>
             <a:extLst>
               <a:ext uri="{909E8E84-426E-40dd-AFC4-6F175D3DCCD1}">
-                <a14:hiddenFill xmlns="" xmlns:a14="http://schemas.microsoft.com/office/drawing/2010/main">
+                <a14:hiddenFill xmlns:a14="http://schemas.microsoft.com/office/drawing/2010/main" xmlns="">
                   <a:solidFill>
                     <a:srgbClr val="FFFFFF"/>
                   </a:solidFill>
                 </a14:hiddenFill>
               </a:ext>
               <a:ext uri="{91240B29-F687-4f45-9708-019B960494DF}">
-                <a14:hiddenLine xmlns="" xmlns:a14="http://schemas.microsoft.com/office/drawing/2010/main" w="9525">
+                <a14:hiddenLine xmlns:a14="http://schemas.microsoft.com/office/drawing/2010/main" xmlns="" w="9525">
                   <a:solidFill>
                     <a:srgbClr val="000000"/>
                   </a:solidFill>
@@ -35959,14 +35959,14 @@
             </a:ln>
             <a:extLst>
               <a:ext uri="{909E8E84-426E-40dd-AFC4-6F175D3DCCD1}">
-                <a14:hiddenFill xmlns="" xmlns:a14="http://schemas.microsoft.com/office/drawing/2010/main">
+                <a14:hiddenFill xmlns:a14="http://schemas.microsoft.com/office/drawing/2010/main" xmlns="">
                   <a:solidFill>
                     <a:srgbClr val="FFFFFF"/>
                   </a:solidFill>
                 </a14:hiddenFill>
               </a:ext>
               <a:ext uri="{91240B29-F687-4f45-9708-019B960494DF}">
-                <a14:hiddenLine xmlns="" xmlns:a14="http://schemas.microsoft.com/office/drawing/2010/main" w="9525">
+                <a14:hiddenLine xmlns:a14="http://schemas.microsoft.com/office/drawing/2010/main" xmlns="" w="9525">
                   <a:solidFill>
                     <a:srgbClr val="000000"/>
                   </a:solidFill>
@@ -36023,14 +36023,14 @@
             </a:ln>
             <a:extLst>
               <a:ext uri="{909E8E84-426E-40dd-AFC4-6F175D3DCCD1}">
-                <a14:hiddenFill xmlns="" xmlns:a14="http://schemas.microsoft.com/office/drawing/2010/main">
+                <a14:hiddenFill xmlns:a14="http://schemas.microsoft.com/office/drawing/2010/main" xmlns="">
                   <a:solidFill>
                     <a:srgbClr val="FFFFFF"/>
                   </a:solidFill>
                 </a14:hiddenFill>
               </a:ext>
               <a:ext uri="{91240B29-F687-4f45-9708-019B960494DF}">
-                <a14:hiddenLine xmlns="" xmlns:a14="http://schemas.microsoft.com/office/drawing/2010/main" w="9525">
+                <a14:hiddenLine xmlns:a14="http://schemas.microsoft.com/office/drawing/2010/main" xmlns="" w="9525">
                   <a:solidFill>
                     <a:srgbClr val="000000"/>
                   </a:solidFill>
@@ -36095,7 +36095,7 @@
             <a:effectLst/>
             <a:extLst>
               <a:ext uri="{AF507438-7753-43e0-B8FC-AC1667EBCBE1}">
-                <a14:hiddenEffects xmlns="" xmlns:a14="http://schemas.microsoft.com/office/drawing/2010/main">
+                <a14:hiddenEffects xmlns:a14="http://schemas.microsoft.com/office/drawing/2010/main" xmlns="">
                   <a:effectLst>
                     <a:outerShdw blurRad="63500" dist="38099" dir="2700000" algn="ctr" rotWithShape="0">
                       <a:schemeClr val="bg2">
@@ -36146,7 +36146,7 @@
             <a:effectLst/>
             <a:extLst>
               <a:ext uri="{AF507438-7753-43e0-B8FC-AC1667EBCBE1}">
-                <a14:hiddenEffects xmlns="" xmlns:a14="http://schemas.microsoft.com/office/drawing/2010/main">
+                <a14:hiddenEffects xmlns:a14="http://schemas.microsoft.com/office/drawing/2010/main" xmlns="">
                   <a:effectLst>
                     <a:outerShdw blurRad="63500" dist="38099" dir="2700000" algn="ctr" rotWithShape="0">
                       <a:schemeClr val="bg2">
@@ -36196,7 +36196,7 @@
             <a:effectLst/>
             <a:extLst>
               <a:ext uri="{AF507438-7753-43e0-B8FC-AC1667EBCBE1}">
-                <a14:hiddenEffects xmlns="" xmlns:a14="http://schemas.microsoft.com/office/drawing/2010/main">
+                <a14:hiddenEffects xmlns:a14="http://schemas.microsoft.com/office/drawing/2010/main" xmlns="">
                   <a:effectLst>
                     <a:outerShdw blurRad="63500" dist="38099" dir="2700000" algn="ctr" rotWithShape="0">
                       <a:schemeClr val="bg2">
@@ -36246,7 +36246,7 @@
             <a:effectLst/>
             <a:extLst>
               <a:ext uri="{AF507438-7753-43e0-B8FC-AC1667EBCBE1}">
-                <a14:hiddenEffects xmlns="" xmlns:a14="http://schemas.microsoft.com/office/drawing/2010/main">
+                <a14:hiddenEffects xmlns:a14="http://schemas.microsoft.com/office/drawing/2010/main" xmlns="">
                   <a:effectLst>
                     <a:outerShdw blurRad="63500" dist="38099" dir="2700000" algn="ctr" rotWithShape="0">
                       <a:schemeClr val="bg2">
@@ -36296,7 +36296,7 @@
             <a:effectLst/>
             <a:extLst>
               <a:ext uri="{AF507438-7753-43e0-B8FC-AC1667EBCBE1}">
-                <a14:hiddenEffects xmlns="" xmlns:a14="http://schemas.microsoft.com/office/drawing/2010/main">
+                <a14:hiddenEffects xmlns:a14="http://schemas.microsoft.com/office/drawing/2010/main" xmlns="">
                   <a:effectLst>
                     <a:outerShdw blurRad="63500" dist="38099" dir="2700000" algn="ctr" rotWithShape="0">
                       <a:schemeClr val="bg2">
@@ -36346,7 +36346,7 @@
             <a:effectLst/>
             <a:extLst>
               <a:ext uri="{AF507438-7753-43e0-B8FC-AC1667EBCBE1}">
-                <a14:hiddenEffects xmlns="" xmlns:a14="http://schemas.microsoft.com/office/drawing/2010/main">
+                <a14:hiddenEffects xmlns:a14="http://schemas.microsoft.com/office/drawing/2010/main" xmlns="">
                   <a:effectLst>
                     <a:outerShdw blurRad="63500" dist="38099" dir="2700000" algn="ctr" rotWithShape="0">
                       <a:schemeClr val="bg2">
@@ -36396,7 +36396,7 @@
             <a:effectLst/>
             <a:extLst>
               <a:ext uri="{AF507438-7753-43e0-B8FC-AC1667EBCBE1}">
-                <a14:hiddenEffects xmlns="" xmlns:a14="http://schemas.microsoft.com/office/drawing/2010/main">
+                <a14:hiddenEffects xmlns:a14="http://schemas.microsoft.com/office/drawing/2010/main" xmlns="">
                   <a:effectLst>
                     <a:outerShdw blurRad="63500" dist="38099" dir="2700000" algn="ctr" rotWithShape="0">
                       <a:schemeClr val="bg2">
@@ -36446,7 +36446,7 @@
             <a:effectLst/>
             <a:extLst>
               <a:ext uri="{AF507438-7753-43e0-B8FC-AC1667EBCBE1}">
-                <a14:hiddenEffects xmlns="" xmlns:a14="http://schemas.microsoft.com/office/drawing/2010/main">
+                <a14:hiddenEffects xmlns:a14="http://schemas.microsoft.com/office/drawing/2010/main" xmlns="">
                   <a:effectLst>
                     <a:outerShdw blurRad="63500" dist="38099" dir="2700000" algn="ctr" rotWithShape="0">
                       <a:schemeClr val="bg2">
@@ -36496,7 +36496,7 @@
             <a:effectLst/>
             <a:extLst>
               <a:ext uri="{AF507438-7753-43e0-B8FC-AC1667EBCBE1}">
-                <a14:hiddenEffects xmlns="" xmlns:a14="http://schemas.microsoft.com/office/drawing/2010/main">
+                <a14:hiddenEffects xmlns:a14="http://schemas.microsoft.com/office/drawing/2010/main" xmlns="">
                   <a:effectLst>
                     <a:outerShdw blurRad="63500" dist="38099" dir="2700000" algn="ctr" rotWithShape="0">
                       <a:schemeClr val="bg2">
@@ -36546,7 +36546,7 @@
             <a:effectLst/>
             <a:extLst>
               <a:ext uri="{AF507438-7753-43e0-B8FC-AC1667EBCBE1}">
-                <a14:hiddenEffects xmlns="" xmlns:a14="http://schemas.microsoft.com/office/drawing/2010/main">
+                <a14:hiddenEffects xmlns:a14="http://schemas.microsoft.com/office/drawing/2010/main" xmlns="">
                   <a:effectLst>
                     <a:outerShdw blurRad="63500" dist="38099" dir="2700000" algn="ctr" rotWithShape="0">
                       <a:schemeClr val="bg2">
@@ -36596,7 +36596,7 @@
             <a:effectLst/>
             <a:extLst>
               <a:ext uri="{AF507438-7753-43e0-B8FC-AC1667EBCBE1}">
-                <a14:hiddenEffects xmlns="" xmlns:a14="http://schemas.microsoft.com/office/drawing/2010/main">
+                <a14:hiddenEffects xmlns:a14="http://schemas.microsoft.com/office/drawing/2010/main" xmlns="">
                   <a:effectLst>
                     <a:outerShdw blurRad="63500" dist="38099" dir="2700000" algn="ctr" rotWithShape="0">
                       <a:schemeClr val="bg2">
@@ -36646,7 +36646,7 @@
             <a:effectLst/>
             <a:extLst>
               <a:ext uri="{AF507438-7753-43e0-B8FC-AC1667EBCBE1}">
-                <a14:hiddenEffects xmlns="" xmlns:a14="http://schemas.microsoft.com/office/drawing/2010/main">
+                <a14:hiddenEffects xmlns:a14="http://schemas.microsoft.com/office/drawing/2010/main" xmlns="">
                   <a:effectLst>
                     <a:outerShdw blurRad="63500" dist="38099" dir="2700000" algn="ctr" rotWithShape="0">
                       <a:schemeClr val="bg2">
@@ -36696,7 +36696,7 @@
             <a:effectLst/>
             <a:extLst>
               <a:ext uri="{AF507438-7753-43e0-B8FC-AC1667EBCBE1}">
-                <a14:hiddenEffects xmlns="" xmlns:a14="http://schemas.microsoft.com/office/drawing/2010/main">
+                <a14:hiddenEffects xmlns:a14="http://schemas.microsoft.com/office/drawing/2010/main" xmlns="">
                   <a:effectLst>
                     <a:outerShdw blurRad="63500" dist="38099" dir="2700000" algn="ctr" rotWithShape="0">
                       <a:schemeClr val="bg2">
@@ -36746,7 +36746,7 @@
             <a:effectLst/>
             <a:extLst>
               <a:ext uri="{AF507438-7753-43e0-B8FC-AC1667EBCBE1}">
-                <a14:hiddenEffects xmlns="" xmlns:a14="http://schemas.microsoft.com/office/drawing/2010/main">
+                <a14:hiddenEffects xmlns:a14="http://schemas.microsoft.com/office/drawing/2010/main" xmlns="">
                   <a:effectLst>
                     <a:outerShdw blurRad="63500" dist="38099" dir="2700000" algn="ctr" rotWithShape="0">
                       <a:schemeClr val="bg2">
@@ -36796,7 +36796,7 @@
             <a:effectLst/>
             <a:extLst>
               <a:ext uri="{AF507438-7753-43e0-B8FC-AC1667EBCBE1}">
-                <a14:hiddenEffects xmlns="" xmlns:a14="http://schemas.microsoft.com/office/drawing/2010/main">
+                <a14:hiddenEffects xmlns:a14="http://schemas.microsoft.com/office/drawing/2010/main" xmlns="">
                   <a:effectLst>
                     <a:outerShdw blurRad="63500" dist="38099" dir="2700000" algn="ctr" rotWithShape="0">
                       <a:schemeClr val="bg2">
@@ -36846,7 +36846,7 @@
             <a:effectLst/>
             <a:extLst>
               <a:ext uri="{AF507438-7753-43e0-B8FC-AC1667EBCBE1}">
-                <a14:hiddenEffects xmlns="" xmlns:a14="http://schemas.microsoft.com/office/drawing/2010/main">
+                <a14:hiddenEffects xmlns:a14="http://schemas.microsoft.com/office/drawing/2010/main" xmlns="">
                   <a:effectLst>
                     <a:outerShdw blurRad="63500" dist="38099" dir="2700000" algn="ctr" rotWithShape="0">
                       <a:schemeClr val="bg2">
@@ -36896,7 +36896,7 @@
             <a:effectLst/>
             <a:extLst>
               <a:ext uri="{AF507438-7753-43e0-B8FC-AC1667EBCBE1}">
-                <a14:hiddenEffects xmlns="" xmlns:a14="http://schemas.microsoft.com/office/drawing/2010/main">
+                <a14:hiddenEffects xmlns:a14="http://schemas.microsoft.com/office/drawing/2010/main" xmlns="">
                   <a:effectLst>
                     <a:outerShdw blurRad="63500" dist="38099" dir="2700000" algn="ctr" rotWithShape="0">
                       <a:schemeClr val="bg2">
@@ -36969,14 +36969,14 @@
               </a:ln>
               <a:extLst>
                 <a:ext uri="{909E8E84-426E-40dd-AFC4-6F175D3DCCD1}">
-                  <a14:hiddenFill xmlns="" xmlns:a14="http://schemas.microsoft.com/office/drawing/2010/main">
+                  <a14:hiddenFill xmlns:a14="http://schemas.microsoft.com/office/drawing/2010/main" xmlns="">
                     <a:solidFill>
                       <a:srgbClr val="FFFFFF"/>
                     </a:solidFill>
                   </a14:hiddenFill>
                 </a:ext>
                 <a:ext uri="{91240B29-F687-4f45-9708-019B960494DF}">
-                  <a14:hiddenLine xmlns="" xmlns:a14="http://schemas.microsoft.com/office/drawing/2010/main" w="9525">
+                  <a14:hiddenLine xmlns:a14="http://schemas.microsoft.com/office/drawing/2010/main" xmlns="" w="9525">
                     <a:solidFill>
                       <a:srgbClr val="000000"/>
                     </a:solidFill>
@@ -37023,14 +37023,14 @@
               </a:ln>
               <a:extLst>
                 <a:ext uri="{909E8E84-426E-40dd-AFC4-6F175D3DCCD1}">
-                  <a14:hiddenFill xmlns="" xmlns:a14="http://schemas.microsoft.com/office/drawing/2010/main">
+                  <a14:hiddenFill xmlns:a14="http://schemas.microsoft.com/office/drawing/2010/main" xmlns="">
                     <a:solidFill>
                       <a:srgbClr val="FFFFFF"/>
                     </a:solidFill>
                   </a14:hiddenFill>
                 </a:ext>
                 <a:ext uri="{91240B29-F687-4f45-9708-019B960494DF}">
-                  <a14:hiddenLine xmlns="" xmlns:a14="http://schemas.microsoft.com/office/drawing/2010/main" w="9525">
+                  <a14:hiddenLine xmlns:a14="http://schemas.microsoft.com/office/drawing/2010/main" xmlns="" w="9525">
                     <a:solidFill>
                       <a:srgbClr val="000000"/>
                     </a:solidFill>
@@ -37087,14 +37087,14 @@
               </a:ln>
               <a:extLst>
                 <a:ext uri="{909E8E84-426E-40dd-AFC4-6F175D3DCCD1}">
-                  <a14:hiddenFill xmlns="" xmlns:a14="http://schemas.microsoft.com/office/drawing/2010/main">
+                  <a14:hiddenFill xmlns:a14="http://schemas.microsoft.com/office/drawing/2010/main" xmlns="">
                     <a:solidFill>
                       <a:srgbClr val="FFFFFF"/>
                     </a:solidFill>
                   </a14:hiddenFill>
                 </a:ext>
                 <a:ext uri="{91240B29-F687-4f45-9708-019B960494DF}">
-                  <a14:hiddenLine xmlns="" xmlns:a14="http://schemas.microsoft.com/office/drawing/2010/main" w="9525">
+                  <a14:hiddenLine xmlns:a14="http://schemas.microsoft.com/office/drawing/2010/main" xmlns="" w="9525">
                     <a:solidFill>
                       <a:srgbClr val="000000"/>
                     </a:solidFill>
@@ -37159,7 +37159,7 @@
               <a:effectLst/>
               <a:extLst>
                 <a:ext uri="{AF507438-7753-43e0-B8FC-AC1667EBCBE1}">
-                  <a14:hiddenEffects xmlns="" xmlns:a14="http://schemas.microsoft.com/office/drawing/2010/main">
+                  <a14:hiddenEffects xmlns:a14="http://schemas.microsoft.com/office/drawing/2010/main" xmlns="">
                     <a:effectLst>
                       <a:outerShdw blurRad="63500" dist="38099" dir="2700000" algn="ctr" rotWithShape="0">
                         <a:schemeClr val="bg2">
@@ -37210,7 +37210,7 @@
               <a:effectLst/>
               <a:extLst>
                 <a:ext uri="{AF507438-7753-43e0-B8FC-AC1667EBCBE1}">
-                  <a14:hiddenEffects xmlns="" xmlns:a14="http://schemas.microsoft.com/office/drawing/2010/main">
+                  <a14:hiddenEffects xmlns:a14="http://schemas.microsoft.com/office/drawing/2010/main" xmlns="">
                     <a:effectLst>
                       <a:outerShdw blurRad="63500" dist="38099" dir="2700000" algn="ctr" rotWithShape="0">
                         <a:schemeClr val="bg2">
@@ -37260,7 +37260,7 @@
               <a:effectLst/>
               <a:extLst>
                 <a:ext uri="{AF507438-7753-43e0-B8FC-AC1667EBCBE1}">
-                  <a14:hiddenEffects xmlns="" xmlns:a14="http://schemas.microsoft.com/office/drawing/2010/main">
+                  <a14:hiddenEffects xmlns:a14="http://schemas.microsoft.com/office/drawing/2010/main" xmlns="">
                     <a:effectLst>
                       <a:outerShdw blurRad="63500" dist="38099" dir="2700000" algn="ctr" rotWithShape="0">
                         <a:schemeClr val="bg2">
@@ -37310,7 +37310,7 @@
               <a:effectLst/>
               <a:extLst>
                 <a:ext uri="{AF507438-7753-43e0-B8FC-AC1667EBCBE1}">
-                  <a14:hiddenEffects xmlns="" xmlns:a14="http://schemas.microsoft.com/office/drawing/2010/main">
+                  <a14:hiddenEffects xmlns:a14="http://schemas.microsoft.com/office/drawing/2010/main" xmlns="">
                     <a:effectLst>
                       <a:outerShdw blurRad="63500" dist="38099" dir="2700000" algn="ctr" rotWithShape="0">
                         <a:schemeClr val="bg2">
@@ -37360,7 +37360,7 @@
               <a:effectLst/>
               <a:extLst>
                 <a:ext uri="{AF507438-7753-43e0-B8FC-AC1667EBCBE1}">
-                  <a14:hiddenEffects xmlns="" xmlns:a14="http://schemas.microsoft.com/office/drawing/2010/main">
+                  <a14:hiddenEffects xmlns:a14="http://schemas.microsoft.com/office/drawing/2010/main" xmlns="">
                     <a:effectLst>
                       <a:outerShdw blurRad="63500" dist="38099" dir="2700000" algn="ctr" rotWithShape="0">
                         <a:schemeClr val="bg2">
@@ -37410,7 +37410,7 @@
               <a:effectLst/>
               <a:extLst>
                 <a:ext uri="{AF507438-7753-43e0-B8FC-AC1667EBCBE1}">
-                  <a14:hiddenEffects xmlns="" xmlns:a14="http://schemas.microsoft.com/office/drawing/2010/main">
+                  <a14:hiddenEffects xmlns:a14="http://schemas.microsoft.com/office/drawing/2010/main" xmlns="">
                     <a:effectLst>
                       <a:outerShdw blurRad="63500" dist="38099" dir="2700000" algn="ctr" rotWithShape="0">
                         <a:schemeClr val="bg2">
@@ -37460,7 +37460,7 @@
               <a:effectLst/>
               <a:extLst>
                 <a:ext uri="{AF507438-7753-43e0-B8FC-AC1667EBCBE1}">
-                  <a14:hiddenEffects xmlns="" xmlns:a14="http://schemas.microsoft.com/office/drawing/2010/main">
+                  <a14:hiddenEffects xmlns:a14="http://schemas.microsoft.com/office/drawing/2010/main" xmlns="">
                     <a:effectLst>
                       <a:outerShdw blurRad="63500" dist="38099" dir="2700000" algn="ctr" rotWithShape="0">
                         <a:schemeClr val="bg2">
@@ -37510,7 +37510,7 @@
               <a:effectLst/>
               <a:extLst>
                 <a:ext uri="{AF507438-7753-43e0-B8FC-AC1667EBCBE1}">
-                  <a14:hiddenEffects xmlns="" xmlns:a14="http://schemas.microsoft.com/office/drawing/2010/main">
+                  <a14:hiddenEffects xmlns:a14="http://schemas.microsoft.com/office/drawing/2010/main" xmlns="">
                     <a:effectLst>
                       <a:outerShdw blurRad="63500" dist="38099" dir="2700000" algn="ctr" rotWithShape="0">
                         <a:schemeClr val="bg2">
@@ -37560,7 +37560,7 @@
               <a:effectLst/>
               <a:extLst>
                 <a:ext uri="{AF507438-7753-43e0-B8FC-AC1667EBCBE1}">
-                  <a14:hiddenEffects xmlns="" xmlns:a14="http://schemas.microsoft.com/office/drawing/2010/main">
+                  <a14:hiddenEffects xmlns:a14="http://schemas.microsoft.com/office/drawing/2010/main" xmlns="">
                     <a:effectLst>
                       <a:outerShdw blurRad="63500" dist="38099" dir="2700000" algn="ctr" rotWithShape="0">
                         <a:schemeClr val="bg2">
@@ -37610,7 +37610,7 @@
               <a:effectLst/>
               <a:extLst>
                 <a:ext uri="{AF507438-7753-43e0-B8FC-AC1667EBCBE1}">
-                  <a14:hiddenEffects xmlns="" xmlns:a14="http://schemas.microsoft.com/office/drawing/2010/main">
+                  <a14:hiddenEffects xmlns:a14="http://schemas.microsoft.com/office/drawing/2010/main" xmlns="">
                     <a:effectLst>
                       <a:outerShdw blurRad="63500" dist="38099" dir="2700000" algn="ctr" rotWithShape="0">
                         <a:schemeClr val="bg2">
@@ -37660,7 +37660,7 @@
               <a:effectLst/>
               <a:extLst>
                 <a:ext uri="{AF507438-7753-43e0-B8FC-AC1667EBCBE1}">
-                  <a14:hiddenEffects xmlns="" xmlns:a14="http://schemas.microsoft.com/office/drawing/2010/main">
+                  <a14:hiddenEffects xmlns:a14="http://schemas.microsoft.com/office/drawing/2010/main" xmlns="">
                     <a:effectLst>
                       <a:outerShdw blurRad="63500" dist="38099" dir="2700000" algn="ctr" rotWithShape="0">
                         <a:schemeClr val="bg2">
@@ -37710,7 +37710,7 @@
               <a:effectLst/>
               <a:extLst>
                 <a:ext uri="{AF507438-7753-43e0-B8FC-AC1667EBCBE1}">
-                  <a14:hiddenEffects xmlns="" xmlns:a14="http://schemas.microsoft.com/office/drawing/2010/main">
+                  <a14:hiddenEffects xmlns:a14="http://schemas.microsoft.com/office/drawing/2010/main" xmlns="">
                     <a:effectLst>
                       <a:outerShdw blurRad="63500" dist="38099" dir="2700000" algn="ctr" rotWithShape="0">
                         <a:schemeClr val="bg2">
@@ -37760,7 +37760,7 @@
               <a:effectLst/>
               <a:extLst>
                 <a:ext uri="{AF507438-7753-43e0-B8FC-AC1667EBCBE1}">
-                  <a14:hiddenEffects xmlns="" xmlns:a14="http://schemas.microsoft.com/office/drawing/2010/main">
+                  <a14:hiddenEffects xmlns:a14="http://schemas.microsoft.com/office/drawing/2010/main" xmlns="">
                     <a:effectLst>
                       <a:outerShdw blurRad="63500" dist="38099" dir="2700000" algn="ctr" rotWithShape="0">
                         <a:schemeClr val="bg2">
@@ -37810,7 +37810,7 @@
               <a:effectLst/>
               <a:extLst>
                 <a:ext uri="{AF507438-7753-43e0-B8FC-AC1667EBCBE1}">
-                  <a14:hiddenEffects xmlns="" xmlns:a14="http://schemas.microsoft.com/office/drawing/2010/main">
+                  <a14:hiddenEffects xmlns:a14="http://schemas.microsoft.com/office/drawing/2010/main" xmlns="">
                     <a:effectLst>
                       <a:outerShdw blurRad="63500" dist="38099" dir="2700000" algn="ctr" rotWithShape="0">
                         <a:schemeClr val="bg2">
@@ -37860,7 +37860,7 @@
               <a:effectLst/>
               <a:extLst>
                 <a:ext uri="{AF507438-7753-43e0-B8FC-AC1667EBCBE1}">
-                  <a14:hiddenEffects xmlns="" xmlns:a14="http://schemas.microsoft.com/office/drawing/2010/main">
+                  <a14:hiddenEffects xmlns:a14="http://schemas.microsoft.com/office/drawing/2010/main" xmlns="">
                     <a:effectLst>
                       <a:outerShdw blurRad="63500" dist="38099" dir="2700000" algn="ctr" rotWithShape="0">
                         <a:schemeClr val="bg2">
@@ -37910,7 +37910,7 @@
               <a:effectLst/>
               <a:extLst>
                 <a:ext uri="{AF507438-7753-43e0-B8FC-AC1667EBCBE1}">
-                  <a14:hiddenEffects xmlns="" xmlns:a14="http://schemas.microsoft.com/office/drawing/2010/main">
+                  <a14:hiddenEffects xmlns:a14="http://schemas.microsoft.com/office/drawing/2010/main" xmlns="">
                     <a:effectLst>
                       <a:outerShdw blurRad="63500" dist="38099" dir="2700000" algn="ctr" rotWithShape="0">
                         <a:schemeClr val="bg2">
@@ -37960,7 +37960,7 @@
               <a:effectLst/>
               <a:extLst>
                 <a:ext uri="{AF507438-7753-43e0-B8FC-AC1667EBCBE1}">
-                  <a14:hiddenEffects xmlns="" xmlns:a14="http://schemas.microsoft.com/office/drawing/2010/main">
+                  <a14:hiddenEffects xmlns:a14="http://schemas.microsoft.com/office/drawing/2010/main" xmlns="">
                     <a:effectLst>
                       <a:outerShdw blurRad="63500" dist="38099" dir="2700000" algn="ctr" rotWithShape="0">
                         <a:schemeClr val="bg2">
@@ -38011,7 +38011,7 @@
             <a:effectLst/>
             <a:extLst>
               <a:ext uri="{AF507438-7753-43e0-B8FC-AC1667EBCBE1}">
-                <a14:hiddenEffects xmlns="" xmlns:a14="http://schemas.microsoft.com/office/drawing/2010/main">
+                <a14:hiddenEffects xmlns:a14="http://schemas.microsoft.com/office/drawing/2010/main" xmlns="">
                   <a:effectLst>
                     <a:outerShdw blurRad="63500" dist="38099" dir="2700000" algn="ctr" rotWithShape="0">
                       <a:schemeClr val="bg2">
@@ -38062,7 +38062,7 @@
             <a:effectLst/>
             <a:extLst>
               <a:ext uri="{AF507438-7753-43e0-B8FC-AC1667EBCBE1}">
-                <a14:hiddenEffects xmlns="" xmlns:a14="http://schemas.microsoft.com/office/drawing/2010/main">
+                <a14:hiddenEffects xmlns:a14="http://schemas.microsoft.com/office/drawing/2010/main" xmlns="">
                   <a:effectLst>
                     <a:outerShdw blurRad="63500" dist="38099" dir="2700000" algn="ctr" rotWithShape="0">
                       <a:schemeClr val="bg2">
@@ -38112,7 +38112,7 @@
             <a:effectLst/>
             <a:extLst>
               <a:ext uri="{AF507438-7753-43e0-B8FC-AC1667EBCBE1}">
-                <a14:hiddenEffects xmlns="" xmlns:a14="http://schemas.microsoft.com/office/drawing/2010/main">
+                <a14:hiddenEffects xmlns:a14="http://schemas.microsoft.com/office/drawing/2010/main" xmlns="">
                   <a:effectLst>
                     <a:outerShdw blurRad="63500" dist="38099" dir="2700000" algn="ctr" rotWithShape="0">
                       <a:schemeClr val="bg2">
@@ -38162,7 +38162,7 @@
             <a:effectLst/>
             <a:extLst>
               <a:ext uri="{AF507438-7753-43e0-B8FC-AC1667EBCBE1}">
-                <a14:hiddenEffects xmlns="" xmlns:a14="http://schemas.microsoft.com/office/drawing/2010/main">
+                <a14:hiddenEffects xmlns:a14="http://schemas.microsoft.com/office/drawing/2010/main" xmlns="">
                   <a:effectLst>
                     <a:outerShdw blurRad="63500" dist="38099" dir="2700000" algn="ctr" rotWithShape="0">
                       <a:schemeClr val="bg2">
@@ -38212,7 +38212,7 @@
             <a:effectLst/>
             <a:extLst>
               <a:ext uri="{AF507438-7753-43e0-B8FC-AC1667EBCBE1}">
-                <a14:hiddenEffects xmlns="" xmlns:a14="http://schemas.microsoft.com/office/drawing/2010/main">
+                <a14:hiddenEffects xmlns:a14="http://schemas.microsoft.com/office/drawing/2010/main" xmlns="">
                   <a:effectLst>
                     <a:outerShdw blurRad="63500" dist="38099" dir="2700000" algn="ctr" rotWithShape="0">
                       <a:schemeClr val="bg2">
@@ -38262,7 +38262,7 @@
             <a:effectLst/>
             <a:extLst>
               <a:ext uri="{AF507438-7753-43e0-B8FC-AC1667EBCBE1}">
-                <a14:hiddenEffects xmlns="" xmlns:a14="http://schemas.microsoft.com/office/drawing/2010/main">
+                <a14:hiddenEffects xmlns:a14="http://schemas.microsoft.com/office/drawing/2010/main" xmlns="">
                   <a:effectLst>
                     <a:outerShdw blurRad="63500" dist="38099" dir="2700000" algn="ctr" rotWithShape="0">
                       <a:schemeClr val="bg2">
@@ -38312,7 +38312,7 @@
             <a:effectLst/>
             <a:extLst>
               <a:ext uri="{AF507438-7753-43e0-B8FC-AC1667EBCBE1}">
-                <a14:hiddenEffects xmlns="" xmlns:a14="http://schemas.microsoft.com/office/drawing/2010/main">
+                <a14:hiddenEffects xmlns:a14="http://schemas.microsoft.com/office/drawing/2010/main" xmlns="">
                   <a:effectLst>
                     <a:outerShdw blurRad="63500" dist="38099" dir="2700000" algn="ctr" rotWithShape="0">
                       <a:schemeClr val="bg2">
@@ -38362,7 +38362,7 @@
             <a:effectLst/>
             <a:extLst>
               <a:ext uri="{AF507438-7753-43e0-B8FC-AC1667EBCBE1}">
-                <a14:hiddenEffects xmlns="" xmlns:a14="http://schemas.microsoft.com/office/drawing/2010/main">
+                <a14:hiddenEffects xmlns:a14="http://schemas.microsoft.com/office/drawing/2010/main" xmlns="">
                   <a:effectLst>
                     <a:outerShdw blurRad="63500" dist="38099" dir="2700000" algn="ctr" rotWithShape="0">
                       <a:schemeClr val="bg2">
@@ -38412,7 +38412,7 @@
             <a:effectLst/>
             <a:extLst>
               <a:ext uri="{AF507438-7753-43e0-B8FC-AC1667EBCBE1}">
-                <a14:hiddenEffects xmlns="" xmlns:a14="http://schemas.microsoft.com/office/drawing/2010/main">
+                <a14:hiddenEffects xmlns:a14="http://schemas.microsoft.com/office/drawing/2010/main" xmlns="">
                   <a:effectLst>
                     <a:outerShdw blurRad="63500" dist="38099" dir="2700000" algn="ctr" rotWithShape="0">
                       <a:schemeClr val="bg2">
@@ -38462,7 +38462,7 @@
             <a:effectLst/>
             <a:extLst>
               <a:ext uri="{AF507438-7753-43e0-B8FC-AC1667EBCBE1}">
-                <a14:hiddenEffects xmlns="" xmlns:a14="http://schemas.microsoft.com/office/drawing/2010/main">
+                <a14:hiddenEffects xmlns:a14="http://schemas.microsoft.com/office/drawing/2010/main" xmlns="">
                   <a:effectLst>
                     <a:outerShdw blurRad="63500" dist="38099" dir="2700000" algn="ctr" rotWithShape="0">
                       <a:schemeClr val="bg2">
@@ -38512,7 +38512,7 @@
             <a:effectLst/>
             <a:extLst>
               <a:ext uri="{AF507438-7753-43e0-B8FC-AC1667EBCBE1}">
-                <a14:hiddenEffects xmlns="" xmlns:a14="http://schemas.microsoft.com/office/drawing/2010/main">
+                <a14:hiddenEffects xmlns:a14="http://schemas.microsoft.com/office/drawing/2010/main" xmlns="">
                   <a:effectLst>
                     <a:outerShdw blurRad="63500" dist="38099" dir="2700000" algn="ctr" rotWithShape="0">
                       <a:schemeClr val="bg2">
@@ -38562,7 +38562,7 @@
             <a:effectLst/>
             <a:extLst>
               <a:ext uri="{AF507438-7753-43e0-B8FC-AC1667EBCBE1}">
-                <a14:hiddenEffects xmlns="" xmlns:a14="http://schemas.microsoft.com/office/drawing/2010/main">
+                <a14:hiddenEffects xmlns:a14="http://schemas.microsoft.com/office/drawing/2010/main" xmlns="">
                   <a:effectLst>
                     <a:outerShdw blurRad="63500" dist="38099" dir="2700000" algn="ctr" rotWithShape="0">
                       <a:schemeClr val="bg2">
@@ -38612,7 +38612,7 @@
             <a:effectLst/>
             <a:extLst>
               <a:ext uri="{AF507438-7753-43e0-B8FC-AC1667EBCBE1}">
-                <a14:hiddenEffects xmlns="" xmlns:a14="http://schemas.microsoft.com/office/drawing/2010/main">
+                <a14:hiddenEffects xmlns:a14="http://schemas.microsoft.com/office/drawing/2010/main" xmlns="">
                   <a:effectLst>
                     <a:outerShdw blurRad="63500" dist="38099" dir="2700000" algn="ctr" rotWithShape="0">
                       <a:schemeClr val="bg2">
@@ -38662,7 +38662,7 @@
             <a:effectLst/>
             <a:extLst>
               <a:ext uri="{AF507438-7753-43e0-B8FC-AC1667EBCBE1}">
-                <a14:hiddenEffects xmlns="" xmlns:a14="http://schemas.microsoft.com/office/drawing/2010/main">
+                <a14:hiddenEffects xmlns:a14="http://schemas.microsoft.com/office/drawing/2010/main" xmlns="">
                   <a:effectLst>
                     <a:outerShdw blurRad="63500" dist="38099" dir="2700000" algn="ctr" rotWithShape="0">
                       <a:schemeClr val="bg2">
@@ -38712,7 +38712,7 @@
             <a:effectLst/>
             <a:extLst>
               <a:ext uri="{AF507438-7753-43e0-B8FC-AC1667EBCBE1}">
-                <a14:hiddenEffects xmlns="" xmlns:a14="http://schemas.microsoft.com/office/drawing/2010/main">
+                <a14:hiddenEffects xmlns:a14="http://schemas.microsoft.com/office/drawing/2010/main" xmlns="">
                   <a:effectLst>
                     <a:outerShdw blurRad="63500" dist="38099" dir="2700000" algn="ctr" rotWithShape="0">
                       <a:schemeClr val="bg2">
@@ -38762,7 +38762,7 @@
             <a:effectLst/>
             <a:extLst>
               <a:ext uri="{AF507438-7753-43e0-B8FC-AC1667EBCBE1}">
-                <a14:hiddenEffects xmlns="" xmlns:a14="http://schemas.microsoft.com/office/drawing/2010/main">
+                <a14:hiddenEffects xmlns:a14="http://schemas.microsoft.com/office/drawing/2010/main" xmlns="">
                   <a:effectLst>
                     <a:outerShdw blurRad="63500" dist="38099" dir="2700000" algn="ctr" rotWithShape="0">
                       <a:schemeClr val="bg2">
@@ -38812,7 +38812,7 @@
             <a:effectLst/>
             <a:extLst>
               <a:ext uri="{AF507438-7753-43e0-B8FC-AC1667EBCBE1}">
-                <a14:hiddenEffects xmlns="" xmlns:a14="http://schemas.microsoft.com/office/drawing/2010/main">
+                <a14:hiddenEffects xmlns:a14="http://schemas.microsoft.com/office/drawing/2010/main" xmlns="">
                   <a:effectLst>
                     <a:outerShdw blurRad="63500" dist="38099" dir="2700000" algn="ctr" rotWithShape="0">
                       <a:schemeClr val="bg2">
@@ -39083,14 +39083,14 @@
           <a:effectLst/>
           <a:extLst>
             <a:ext uri="{909E8E84-426E-40dd-AFC4-6F175D3DCCD1}">
-              <a14:hiddenFill xmlns="" xmlns:a14="http://schemas.microsoft.com/office/drawing/2010/main">
+              <a14:hiddenFill xmlns:a14="http://schemas.microsoft.com/office/drawing/2010/main" xmlns="">
                 <a:solidFill>
                   <a:schemeClr val="accent1"/>
                 </a:solidFill>
               </a14:hiddenFill>
             </a:ext>
             <a:ext uri="{91240B29-F687-4f45-9708-019B960494DF}">
-              <a14:hiddenLine xmlns="" xmlns:a14="http://schemas.microsoft.com/office/drawing/2010/main" w="9525">
+              <a14:hiddenLine xmlns:a14="http://schemas.microsoft.com/office/drawing/2010/main" xmlns="" w="9525">
                 <a:solidFill>
                   <a:schemeClr val="tx1"/>
                 </a:solidFill>
@@ -39100,7 +39100,7 @@
               </a14:hiddenLine>
             </a:ext>
             <a:ext uri="{AF507438-7753-43e0-B8FC-AC1667EBCBE1}">
-              <a14:hiddenEffects xmlns="" xmlns:a14="http://schemas.microsoft.com/office/drawing/2010/main">
+              <a14:hiddenEffects xmlns:a14="http://schemas.microsoft.com/office/drawing/2010/main" xmlns="">
                 <a:effectLst>
                   <a:outerShdw blurRad="63500" dist="38099" dir="2700000" algn="ctr" rotWithShape="0">
                     <a:schemeClr val="bg2">
@@ -39111,7 +39111,7 @@
               </a14:hiddenEffects>
             </a:ext>
             <a:ext uri="{FAA26D3D-D897-4be2-8F04-BA451C77F1D7}">
-              <ma14:placeholderFlag xmlns="" xmlns:ma14="http://schemas.microsoft.com/office/mac/drawingml/2011/main" val="1"/>
+              <ma14:placeholderFlag xmlns:ma14="http://schemas.microsoft.com/office/mac/drawingml/2011/main" xmlns="" val="1"/>
             </a:ext>
           </a:extLst>
         </p:spPr>
@@ -39821,14 +39821,14 @@
           </a:ln>
           <a:extLst>
             <a:ext uri="{909E8E84-426E-40dd-AFC4-6F175D3DCCD1}">
-              <a14:hiddenFill xmlns="" xmlns:a14="http://schemas.microsoft.com/office/drawing/2010/main">
+              <a14:hiddenFill xmlns:a14="http://schemas.microsoft.com/office/drawing/2010/main" xmlns="">
                 <a:solidFill>
                   <a:srgbClr val="FFFFFF"/>
                 </a:solidFill>
               </a14:hiddenFill>
             </a:ext>
             <a:ext uri="{91240B29-F687-4f45-9708-019B960494DF}">
-              <a14:hiddenLine xmlns="" xmlns:a14="http://schemas.microsoft.com/office/drawing/2010/main" w="9525">
+              <a14:hiddenLine xmlns:a14="http://schemas.microsoft.com/office/drawing/2010/main" xmlns="" w="9525">
                 <a:solidFill>
                   <a:srgbClr val="000000"/>
                 </a:solidFill>
@@ -39925,14 +39925,14 @@
           <a:effectLst/>
           <a:extLst>
             <a:ext uri="{909E8E84-426E-40dd-AFC4-6F175D3DCCD1}">
-              <a14:hiddenFill xmlns="" xmlns:a14="http://schemas.microsoft.com/office/drawing/2010/main">
+              <a14:hiddenFill xmlns:a14="http://schemas.microsoft.com/office/drawing/2010/main" xmlns="">
                 <a:solidFill>
                   <a:schemeClr val="accent1"/>
                 </a:solidFill>
               </a14:hiddenFill>
             </a:ext>
             <a:ext uri="{91240B29-F687-4f45-9708-019B960494DF}">
-              <a14:hiddenLine xmlns="" xmlns:a14="http://schemas.microsoft.com/office/drawing/2010/main" w="9525">
+              <a14:hiddenLine xmlns:a14="http://schemas.microsoft.com/office/drawing/2010/main" xmlns="" w="9525">
                 <a:solidFill>
                   <a:schemeClr val="tx1"/>
                 </a:solidFill>
@@ -39942,7 +39942,7 @@
               </a14:hiddenLine>
             </a:ext>
             <a:ext uri="{AF507438-7753-43e0-B8FC-AC1667EBCBE1}">
-              <a14:hiddenEffects xmlns="" xmlns:a14="http://schemas.microsoft.com/office/drawing/2010/main">
+              <a14:hiddenEffects xmlns:a14="http://schemas.microsoft.com/office/drawing/2010/main" xmlns="">
                 <a:effectLst>
                   <a:outerShdw blurRad="63500" dist="38099" dir="2700000" algn="ctr" rotWithShape="0">
                     <a:schemeClr val="bg2">
@@ -39953,7 +39953,7 @@
               </a14:hiddenEffects>
             </a:ext>
             <a:ext uri="{FAA26D3D-D897-4be2-8F04-BA451C77F1D7}">
-              <ma14:placeholderFlag xmlns="" xmlns:ma14="http://schemas.microsoft.com/office/mac/drawingml/2011/main" val="1"/>
+              <ma14:placeholderFlag xmlns:ma14="http://schemas.microsoft.com/office/mac/drawingml/2011/main" xmlns="" val="1"/>
             </a:ext>
           </a:extLst>
         </p:spPr>
@@ -40086,14 +40086,14 @@
           </a:ln>
           <a:extLst>
             <a:ext uri="{909E8E84-426E-40dd-AFC4-6F175D3DCCD1}">
-              <a14:hiddenFill xmlns="" xmlns:a14="http://schemas.microsoft.com/office/drawing/2010/main">
+              <a14:hiddenFill xmlns:a14="http://schemas.microsoft.com/office/drawing/2010/main" xmlns="">
                 <a:solidFill>
                   <a:srgbClr val="FFFFFF"/>
                 </a:solidFill>
               </a14:hiddenFill>
             </a:ext>
             <a:ext uri="{91240B29-F687-4f45-9708-019B960494DF}">
-              <a14:hiddenLine xmlns="" xmlns:a14="http://schemas.microsoft.com/office/drawing/2010/main" w="9525">
+              <a14:hiddenLine xmlns:a14="http://schemas.microsoft.com/office/drawing/2010/main" xmlns="" w="9525">
                 <a:solidFill>
                   <a:srgbClr val="000000"/>
                 </a:solidFill>
@@ -40126,14 +40126,14 @@
           <a:effectLst/>
           <a:extLst>
             <a:ext uri="{909E8E84-426E-40dd-AFC4-6F175D3DCCD1}">
-              <a14:hiddenFill xmlns="" xmlns:a14="http://schemas.microsoft.com/office/drawing/2010/main">
+              <a14:hiddenFill xmlns:a14="http://schemas.microsoft.com/office/drawing/2010/main" xmlns="">
                 <a:solidFill>
                   <a:schemeClr val="accent1"/>
                 </a:solidFill>
               </a14:hiddenFill>
             </a:ext>
             <a:ext uri="{91240B29-F687-4f45-9708-019B960494DF}">
-              <a14:hiddenLine xmlns="" xmlns:a14="http://schemas.microsoft.com/office/drawing/2010/main" w="9525">
+              <a14:hiddenLine xmlns:a14="http://schemas.microsoft.com/office/drawing/2010/main" xmlns="" w="9525">
                 <a:solidFill>
                   <a:schemeClr val="tx1"/>
                 </a:solidFill>
@@ -40143,7 +40143,7 @@
               </a14:hiddenLine>
             </a:ext>
             <a:ext uri="{AF507438-7753-43e0-B8FC-AC1667EBCBE1}">
-              <a14:hiddenEffects xmlns="" xmlns:a14="http://schemas.microsoft.com/office/drawing/2010/main">
+              <a14:hiddenEffects xmlns:a14="http://schemas.microsoft.com/office/drawing/2010/main" xmlns="">
                 <a:effectLst>
                   <a:outerShdw blurRad="63500" dist="38099" dir="2700000" algn="ctr" rotWithShape="0">
                     <a:schemeClr val="bg2">
@@ -40154,7 +40154,7 @@
               </a14:hiddenEffects>
             </a:ext>
             <a:ext uri="{FAA26D3D-D897-4be2-8F04-BA451C77F1D7}">
-              <ma14:placeholderFlag xmlns="" xmlns:ma14="http://schemas.microsoft.com/office/mac/drawingml/2011/main" val="1"/>
+              <ma14:placeholderFlag xmlns:ma14="http://schemas.microsoft.com/office/mac/drawingml/2011/main" xmlns="" val="1"/>
             </a:ext>
           </a:extLst>
         </p:spPr>
@@ -40276,7 +40276,7 @@
         </p:blipFill>
         <p:spPr bwMode="auto">
           <a:xfrm>
-            <a:off x="468313" y="2852738"/>
+            <a:off x="468313" y="2892227"/>
             <a:ext cx="7874000" cy="1112837"/>
           </a:xfrm>
           <a:prstGeom prst="rect">
@@ -40288,14 +40288,14 @@
           </a:ln>
           <a:extLst>
             <a:ext uri="{909E8E84-426E-40dd-AFC4-6F175D3DCCD1}">
-              <a14:hiddenFill xmlns="" xmlns:a14="http://schemas.microsoft.com/office/drawing/2010/main">
+              <a14:hiddenFill xmlns:a14="http://schemas.microsoft.com/office/drawing/2010/main" xmlns="">
                 <a:solidFill>
                   <a:srgbClr val="FFFFFF"/>
                 </a:solidFill>
               </a14:hiddenFill>
             </a:ext>
             <a:ext uri="{91240B29-F687-4f45-9708-019B960494DF}">
-              <a14:hiddenLine xmlns="" xmlns:a14="http://schemas.microsoft.com/office/drawing/2010/main" w="9525">
+              <a14:hiddenLine xmlns:a14="http://schemas.microsoft.com/office/drawing/2010/main" xmlns="" w="9525">
                 <a:solidFill>
                   <a:srgbClr val="000000"/>
                 </a:solidFill>
@@ -40328,14 +40328,14 @@
           <a:effectLst/>
           <a:extLst>
             <a:ext uri="{909E8E84-426E-40dd-AFC4-6F175D3DCCD1}">
-              <a14:hiddenFill xmlns="" xmlns:a14="http://schemas.microsoft.com/office/drawing/2010/main">
+              <a14:hiddenFill xmlns:a14="http://schemas.microsoft.com/office/drawing/2010/main" xmlns="">
                 <a:solidFill>
                   <a:schemeClr val="accent1"/>
                 </a:solidFill>
               </a14:hiddenFill>
             </a:ext>
             <a:ext uri="{91240B29-F687-4f45-9708-019B960494DF}">
-              <a14:hiddenLine xmlns="" xmlns:a14="http://schemas.microsoft.com/office/drawing/2010/main" w="9525">
+              <a14:hiddenLine xmlns:a14="http://schemas.microsoft.com/office/drawing/2010/main" xmlns="" w="9525">
                 <a:solidFill>
                   <a:schemeClr val="tx1"/>
                 </a:solidFill>
@@ -40345,7 +40345,7 @@
               </a14:hiddenLine>
             </a:ext>
             <a:ext uri="{AF507438-7753-43e0-B8FC-AC1667EBCBE1}">
-              <a14:hiddenEffects xmlns="" xmlns:a14="http://schemas.microsoft.com/office/drawing/2010/main">
+              <a14:hiddenEffects xmlns:a14="http://schemas.microsoft.com/office/drawing/2010/main" xmlns="">
                 <a:effectLst>
                   <a:outerShdw blurRad="63500" dist="38099" dir="2700000" algn="ctr" rotWithShape="0">
                     <a:schemeClr val="bg2">
@@ -40356,7 +40356,7 @@
               </a14:hiddenEffects>
             </a:ext>
             <a:ext uri="{FAA26D3D-D897-4be2-8F04-BA451C77F1D7}">
-              <ma14:placeholderFlag xmlns="" xmlns:ma14="http://schemas.microsoft.com/office/mac/drawingml/2011/main" val="1"/>
+              <ma14:placeholderFlag xmlns:ma14="http://schemas.microsoft.com/office/mac/drawingml/2011/main" xmlns="" val="1"/>
             </a:ext>
           </a:extLst>
         </p:spPr>
@@ -40490,14 +40490,14 @@
           </a:ln>
           <a:extLst>
             <a:ext uri="{909E8E84-426E-40dd-AFC4-6F175D3DCCD1}">
-              <a14:hiddenFill xmlns="" xmlns:a14="http://schemas.microsoft.com/office/drawing/2010/main">
+              <a14:hiddenFill xmlns:a14="http://schemas.microsoft.com/office/drawing/2010/main" xmlns="">
                 <a:solidFill>
                   <a:srgbClr val="FFFFFF"/>
                 </a:solidFill>
               </a14:hiddenFill>
             </a:ext>
             <a:ext uri="{91240B29-F687-4f45-9708-019B960494DF}">
-              <a14:hiddenLine xmlns="" xmlns:a14="http://schemas.microsoft.com/office/drawing/2010/main" w="9525">
+              <a14:hiddenLine xmlns:a14="http://schemas.microsoft.com/office/drawing/2010/main" xmlns="" w="9525">
                 <a:solidFill>
                   <a:srgbClr val="000000"/>
                 </a:solidFill>
@@ -40530,14 +40530,14 @@
           <a:effectLst/>
           <a:extLst>
             <a:ext uri="{909E8E84-426E-40dd-AFC4-6F175D3DCCD1}">
-              <a14:hiddenFill xmlns="" xmlns:a14="http://schemas.microsoft.com/office/drawing/2010/main">
+              <a14:hiddenFill xmlns:a14="http://schemas.microsoft.com/office/drawing/2010/main" xmlns="">
                 <a:solidFill>
                   <a:schemeClr val="accent1"/>
                 </a:solidFill>
               </a14:hiddenFill>
             </a:ext>
             <a:ext uri="{91240B29-F687-4f45-9708-019B960494DF}">
-              <a14:hiddenLine xmlns="" xmlns:a14="http://schemas.microsoft.com/office/drawing/2010/main" w="9525">
+              <a14:hiddenLine xmlns:a14="http://schemas.microsoft.com/office/drawing/2010/main" xmlns="" w="9525">
                 <a:solidFill>
                   <a:schemeClr val="tx1"/>
                 </a:solidFill>
@@ -40547,7 +40547,7 @@
               </a14:hiddenLine>
             </a:ext>
             <a:ext uri="{AF507438-7753-43e0-B8FC-AC1667EBCBE1}">
-              <a14:hiddenEffects xmlns="" xmlns:a14="http://schemas.microsoft.com/office/drawing/2010/main">
+              <a14:hiddenEffects xmlns:a14="http://schemas.microsoft.com/office/drawing/2010/main" xmlns="">
                 <a:effectLst>
                   <a:outerShdw blurRad="63500" dist="38099" dir="2700000" algn="ctr" rotWithShape="0">
                     <a:schemeClr val="bg2">
@@ -40558,7 +40558,7 @@
               </a14:hiddenEffects>
             </a:ext>
             <a:ext uri="{FAA26D3D-D897-4be2-8F04-BA451C77F1D7}">
-              <ma14:placeholderFlag xmlns="" xmlns:ma14="http://schemas.microsoft.com/office/mac/drawingml/2011/main" val="1"/>
+              <ma14:placeholderFlag xmlns:ma14="http://schemas.microsoft.com/office/mac/drawingml/2011/main" xmlns="" val="1"/>
             </a:ext>
           </a:extLst>
         </p:spPr>
@@ -41243,14 +41243,14 @@
         <a:effectLst/>
         <a:extLst>
           <a:ext uri="{909E8E84-426E-40dd-AFC4-6F175D3DCCD1}">
-            <a14:hiddenFill xmlns="" xmlns:a14="http://schemas.microsoft.com/office/drawing/2010/main">
+            <a14:hiddenFill xmlns:a14="http://schemas.microsoft.com/office/drawing/2010/main" xmlns="">
               <a:solidFill>
                 <a:schemeClr val="accent1"/>
               </a:solidFill>
             </a14:hiddenFill>
           </a:ext>
           <a:ext uri="{91240B29-F687-4f45-9708-019B960494DF}">
-            <a14:hiddenLine xmlns="" xmlns:a14="http://schemas.microsoft.com/office/drawing/2010/main" w="9525">
+            <a14:hiddenLine xmlns:a14="http://schemas.microsoft.com/office/drawing/2010/main" xmlns="" w="9525">
               <a:solidFill>
                 <a:schemeClr val="tx1"/>
               </a:solidFill>
@@ -41260,7 +41260,7 @@
             </a14:hiddenLine>
           </a:ext>
           <a:ext uri="{AF507438-7753-43e0-B8FC-AC1667EBCBE1}">
-            <a14:hiddenEffects xmlns="" xmlns:a14="http://schemas.microsoft.com/office/drawing/2010/main">
+            <a14:hiddenEffects xmlns:a14="http://schemas.microsoft.com/office/drawing/2010/main" xmlns="">
               <a:effectLst>
                 <a:outerShdw blurRad="63500" dist="38099" dir="2700000" algn="ctr" rotWithShape="0">
                   <a:schemeClr val="bg2">
@@ -41271,7 +41271,7 @@
             </a14:hiddenEffects>
           </a:ext>
           <a:ext uri="{FAA26D3D-D897-4be2-8F04-BA451C77F1D7}">
-            <ma14:placeholderFlag xmlns="" xmlns:ma14="http://schemas.microsoft.com/office/mac/drawingml/2011/main" val="1"/>
+            <ma14:placeholderFlag xmlns:ma14="http://schemas.microsoft.com/office/mac/drawingml/2011/main" xmlns="" val="1"/>
           </a:ext>
         </a:extLst>
       </a:spPr>

</xml_diff>